<commit_message>
added part 2 to ppt
</commit_message>
<xml_diff>
--- a/Preparation files/MyTEDx_Presentazione.pptx
+++ b/Preparation files/MyTEDx_Presentazione.pptx
@@ -13,6 +13,9 @@
     <p:sldId id="265" r:id="rId7"/>
     <p:sldId id="263" r:id="rId8"/>
     <p:sldId id="264" r:id="rId9"/>
+    <p:sldId id="266" r:id="rId10"/>
+    <p:sldId id="267" r:id="rId11"/>
+    <p:sldId id="268" r:id="rId12"/>
   </p:sldIdLst>
   <p:sldSz cx="12192000" cy="6858000"/>
   <p:notesSz cx="6858000" cy="9144000"/>
@@ -363,7 +366,7 @@
           <a:p>
             <a:fld id="{9184DA70-C731-4C70-880D-CCD4705E623C}" type="datetime1">
               <a:rPr lang="en-US" smtClean="0"/>
-              <a:t>5/18/2020</a:t>
+              <a:t>5/19/2020</a:t>
             </a:fld>
             <a:endParaRPr lang="en-US" dirty="0"/>
           </a:p>
@@ -551,7 +554,7 @@
           <a:p>
             <a:fld id="{B612A279-0833-481D-8C56-F67FD0AC6C50}" type="datetime1">
               <a:rPr lang="en-US" smtClean="0"/>
-              <a:t>5/18/2020</a:t>
+              <a:t>5/19/2020</a:t>
             </a:fld>
             <a:endParaRPr lang="en-US" dirty="0"/>
           </a:p>
@@ -793,7 +796,7 @@
           <a:p>
             <a:fld id="{6587DA83-5663-4C9C-B9AA-0B40A3DAFF81}" type="datetime1">
               <a:rPr lang="en-US" smtClean="0"/>
-              <a:t>5/18/2020</a:t>
+              <a:t>5/19/2020</a:t>
             </a:fld>
             <a:endParaRPr lang="en-US" dirty="0"/>
           </a:p>
@@ -981,7 +984,7 @@
           <a:p>
             <a:fld id="{4BE1D723-8F53-4F53-90B0-1982A396982E}" type="datetime1">
               <a:rPr lang="en-US" smtClean="0"/>
-              <a:t>5/18/2020</a:t>
+              <a:t>5/19/2020</a:t>
             </a:fld>
             <a:endParaRPr lang="en-US" dirty="0"/>
           </a:p>
@@ -1354,7 +1357,7 @@
           <a:p>
             <a:fld id="{97669AF7-7BEB-44E4-9852-375E34362B5B}" type="datetime1">
               <a:rPr lang="en-US" smtClean="0"/>
-              <a:t>5/18/2020</a:t>
+              <a:t>5/19/2020</a:t>
             </a:fld>
             <a:endParaRPr lang="en-US" dirty="0"/>
           </a:p>
@@ -1609,7 +1612,7 @@
           <a:p>
             <a:fld id="{BAAAC38D-0552-4C82-B593-E6124DFADBE2}" type="datetime1">
               <a:rPr lang="en-US" smtClean="0"/>
-              <a:t>5/18/2020</a:t>
+              <a:t>5/19/2020</a:t>
             </a:fld>
             <a:endParaRPr lang="en-US" dirty="0"/>
           </a:p>
@@ -2006,7 +2009,7 @@
           <a:p>
             <a:fld id="{D9DF0F1C-5577-4ACB-BB62-DF8F3C494C7E}" type="datetime1">
               <a:rPr lang="en-US" smtClean="0"/>
-              <a:t>5/18/2020</a:t>
+              <a:t>5/19/2020</a:t>
             </a:fld>
             <a:endParaRPr lang="en-US" dirty="0"/>
           </a:p>
@@ -2142,7 +2145,7 @@
           <a:p>
             <a:fld id="{1775B394-D9F9-4F0C-B15D-605F45CB9E9F}" type="datetime1">
               <a:rPr lang="en-US" smtClean="0"/>
-              <a:t>5/18/2020</a:t>
+              <a:t>5/19/2020</a:t>
             </a:fld>
             <a:endParaRPr lang="en-US" dirty="0"/>
           </a:p>
@@ -2299,7 +2302,7 @@
           <a:p>
             <a:fld id="{39667345-2558-425A-8533-9BFDBCE15005}" type="datetime1">
               <a:rPr lang="en-US" smtClean="0"/>
-              <a:t>5/18/2020</a:t>
+              <a:t>5/19/2020</a:t>
             </a:fld>
             <a:endParaRPr lang="en-US" dirty="0"/>
           </a:p>
@@ -2628,7 +2631,7 @@
           <a:p>
             <a:fld id="{92BEA474-078D-4E9B-9B14-09A87B19DC46}" type="datetime1">
               <a:rPr lang="en-US" smtClean="0"/>
-              <a:t>5/18/2020</a:t>
+              <a:t>5/19/2020</a:t>
             </a:fld>
             <a:endParaRPr lang="en-US" dirty="0"/>
           </a:p>
@@ -2978,7 +2981,7 @@
           <a:p>
             <a:fld id="{4907D986-8816-4272-A432-0437A28A9828}" type="datetime1">
               <a:rPr lang="en-US" smtClean="0"/>
-              <a:t>5/18/2020</a:t>
+              <a:t>5/19/2020</a:t>
             </a:fld>
             <a:endParaRPr lang="en-US" dirty="0"/>
           </a:p>
@@ -3239,7 +3242,7 @@
           <a:p>
             <a:fld id="{62D6E202-B606-4609-B914-27C9371A1F6D}" type="datetime1">
               <a:rPr lang="en-US" smtClean="0"/>
-              <a:t>5/18/2020</a:t>
+              <a:t>5/19/2020</a:t>
             </a:fld>
             <a:endParaRPr lang="en-US" dirty="0"/>
           </a:p>
@@ -3936,7 +3939,7 @@
           <a:lstStyle/>
           <a:p>
             <a:pPr algn="ctr"/>
-            <a:endParaRPr lang="en-US"/>
+            <a:endParaRPr lang="en-US" dirty="0"/>
           </a:p>
         </p:txBody>
       </p:sp>
@@ -3969,7 +3972,7 @@
           <a:lstStyle/>
           <a:p>
             <a:r>
-              <a:rPr lang="en-US" sz="9600" dirty="0" err="1">
+              <a:rPr lang="en-US" sz="9600" dirty="0">
                 <a:solidFill>
                   <a:schemeClr val="tx1">
                     <a:lumMod val="85000"/>
@@ -3979,14 +3982,6 @@
               </a:rPr>
               <a:t>MyTEDx</a:t>
             </a:r>
-            <a:endParaRPr lang="en-US" sz="9600" dirty="0">
-              <a:solidFill>
-                <a:schemeClr val="tx1">
-                  <a:lumMod val="85000"/>
-                  <a:lumOff val="15000"/>
-                </a:schemeClr>
-              </a:solidFill>
-            </a:endParaRPr>
           </a:p>
         </p:txBody>
       </p:sp>
@@ -4180,6 +4175,172 @@
     <p:extLst>
       <p:ext uri="{BB962C8B-B14F-4D97-AF65-F5344CB8AC3E}">
         <p14:creationId xmlns:p14="http://schemas.microsoft.com/office/powerpoint/2010/main" val="3741972818"/>
+      </p:ext>
+    </p:extLst>
+  </p:cSld>
+  <p:clrMapOvr>
+    <a:masterClrMapping/>
+  </p:clrMapOvr>
+</p:sld>
+</file>
+
+<file path=ppt/slides/slide10.xml><?xml version="1.0" encoding="utf-8"?>
+<p:sld xmlns:a="http://schemas.openxmlformats.org/drawingml/2006/main" xmlns:r="http://schemas.openxmlformats.org/officeDocument/2006/relationships" xmlns:p="http://schemas.openxmlformats.org/presentationml/2006/main">
+  <p:cSld>
+    <p:spTree>
+      <p:nvGrpSpPr>
+        <p:cNvPr id="1" name=""/>
+        <p:cNvGrpSpPr/>
+        <p:nvPr/>
+      </p:nvGrpSpPr>
+      <p:grpSpPr>
+        <a:xfrm>
+          <a:off x="0" y="0"/>
+          <a:ext cx="0" cy="0"/>
+          <a:chOff x="0" y="0"/>
+          <a:chExt cx="0" cy="0"/>
+        </a:xfrm>
+      </p:grpSpPr>
+      <p:sp>
+        <p:nvSpPr>
+          <p:cNvPr id="2" name="Titolo 1">
+            <a:extLst>
+              <a:ext uri="{FF2B5EF4-FFF2-40B4-BE49-F238E27FC236}">
+                <a16:creationId xmlns:a16="http://schemas.microsoft.com/office/drawing/2014/main" id="{58C9873F-9E98-4CC6-AF2D-4752D047EEDA}"/>
+              </a:ext>
+            </a:extLst>
+          </p:cNvPr>
+          <p:cNvSpPr>
+            <a:spLocks noGrp="1"/>
+          </p:cNvSpPr>
+          <p:nvPr>
+            <p:ph type="title"/>
+          </p:nvPr>
+        </p:nvSpPr>
+        <p:spPr/>
+        <p:txBody>
+          <a:bodyPr/>
+          <a:lstStyle/>
+          <a:p>
+            <a:r>
+              <a:rPr lang="it-IT" dirty="0"/>
+              <a:t>Criticità tecniche</a:t>
+            </a:r>
+          </a:p>
+        </p:txBody>
+      </p:sp>
+      <p:sp>
+        <p:nvSpPr>
+          <p:cNvPr id="3" name="Segnaposto contenuto 2">
+            <a:extLst>
+              <a:ext uri="{FF2B5EF4-FFF2-40B4-BE49-F238E27FC236}">
+                <a16:creationId xmlns:a16="http://schemas.microsoft.com/office/drawing/2014/main" id="{F172B9AB-78CE-4EAD-8636-DF08369AFF5D}"/>
+              </a:ext>
+            </a:extLst>
+          </p:cNvPr>
+          <p:cNvSpPr>
+            <a:spLocks noGrp="1"/>
+          </p:cNvSpPr>
+          <p:nvPr>
+            <p:ph idx="1"/>
+          </p:nvPr>
+        </p:nvSpPr>
+        <p:spPr/>
+        <p:txBody>
+          <a:bodyPr/>
+          <a:lstStyle/>
+          <a:p>
+            <a:endParaRPr lang="it-IT" dirty="0"/>
+          </a:p>
+        </p:txBody>
+      </p:sp>
+    </p:spTree>
+    <p:extLst>
+      <p:ext uri="{BB962C8B-B14F-4D97-AF65-F5344CB8AC3E}">
+        <p14:creationId xmlns:p14="http://schemas.microsoft.com/office/powerpoint/2010/main" val="3429340440"/>
+      </p:ext>
+    </p:extLst>
+  </p:cSld>
+  <p:clrMapOvr>
+    <a:masterClrMapping/>
+  </p:clrMapOvr>
+</p:sld>
+</file>
+
+<file path=ppt/slides/slide11.xml><?xml version="1.0" encoding="utf-8"?>
+<p:sld xmlns:a="http://schemas.openxmlformats.org/drawingml/2006/main" xmlns:r="http://schemas.openxmlformats.org/officeDocument/2006/relationships" xmlns:p="http://schemas.openxmlformats.org/presentationml/2006/main">
+  <p:cSld>
+    <p:spTree>
+      <p:nvGrpSpPr>
+        <p:cNvPr id="1" name=""/>
+        <p:cNvGrpSpPr/>
+        <p:nvPr/>
+      </p:nvGrpSpPr>
+      <p:grpSpPr>
+        <a:xfrm>
+          <a:off x="0" y="0"/>
+          <a:ext cx="0" cy="0"/>
+          <a:chOff x="0" y="0"/>
+          <a:chExt cx="0" cy="0"/>
+        </a:xfrm>
+      </p:grpSpPr>
+      <p:sp>
+        <p:nvSpPr>
+          <p:cNvPr id="2" name="Titolo 1">
+            <a:extLst>
+              <a:ext uri="{FF2B5EF4-FFF2-40B4-BE49-F238E27FC236}">
+                <a16:creationId xmlns:a16="http://schemas.microsoft.com/office/drawing/2014/main" id="{EB0A27D9-D7FF-4387-874B-47CCD95B29CB}"/>
+              </a:ext>
+            </a:extLst>
+          </p:cNvPr>
+          <p:cNvSpPr>
+            <a:spLocks noGrp="1"/>
+          </p:cNvSpPr>
+          <p:nvPr>
+            <p:ph type="title"/>
+          </p:nvPr>
+        </p:nvSpPr>
+        <p:spPr/>
+        <p:txBody>
+          <a:bodyPr/>
+          <a:lstStyle/>
+          <a:p>
+            <a:r>
+              <a:rPr lang="it-IT" dirty="0"/>
+              <a:t>Possibili evoluzioni</a:t>
+            </a:r>
+          </a:p>
+        </p:txBody>
+      </p:sp>
+      <p:sp>
+        <p:nvSpPr>
+          <p:cNvPr id="3" name="Segnaposto contenuto 2">
+            <a:extLst>
+              <a:ext uri="{FF2B5EF4-FFF2-40B4-BE49-F238E27FC236}">
+                <a16:creationId xmlns:a16="http://schemas.microsoft.com/office/drawing/2014/main" id="{361F82CC-CBC3-4FC3-971E-8766FA0FEBE2}"/>
+              </a:ext>
+            </a:extLst>
+          </p:cNvPr>
+          <p:cNvSpPr>
+            <a:spLocks noGrp="1"/>
+          </p:cNvSpPr>
+          <p:nvPr>
+            <p:ph idx="1"/>
+          </p:nvPr>
+        </p:nvSpPr>
+        <p:spPr/>
+        <p:txBody>
+          <a:bodyPr/>
+          <a:lstStyle/>
+          <a:p>
+            <a:endParaRPr lang="it-IT"/>
+          </a:p>
+        </p:txBody>
+      </p:sp>
+    </p:spTree>
+    <p:extLst>
+      <p:ext uri="{BB962C8B-B14F-4D97-AF65-F5344CB8AC3E}">
+        <p14:creationId xmlns:p14="http://schemas.microsoft.com/office/powerpoint/2010/main" val="2823964483"/>
       </p:ext>
     </p:extLst>
   </p:cSld>
@@ -4484,7 +4645,7 @@
           <a:lstStyle/>
           <a:p>
             <a:pPr algn="ctr"/>
-            <a:endParaRPr lang="en-US"/>
+            <a:endParaRPr lang="en-US" dirty="0"/>
           </a:p>
         </p:txBody>
       </p:sp>
@@ -4572,7 +4733,7 @@
           <a:lstStyle/>
           <a:p>
             <a:r>
-              <a:rPr lang="it-IT" sz="4400">
+              <a:rPr lang="it-IT" sz="4400" dirty="0">
                 <a:solidFill>
                   <a:srgbClr val="FFFFFF"/>
                 </a:solidFill>
@@ -4856,7 +5017,7 @@
           <a:lstStyle/>
           <a:p>
             <a:pPr algn="ctr"/>
-            <a:endParaRPr lang="en-US"/>
+            <a:endParaRPr lang="en-US" dirty="0"/>
           </a:p>
         </p:txBody>
       </p:sp>
@@ -4944,7 +5105,7 @@
           <a:lstStyle/>
           <a:p>
             <a:r>
-              <a:rPr lang="it-IT" sz="4400">
+              <a:rPr lang="it-IT" sz="4400" dirty="0">
                 <a:solidFill>
                   <a:srgbClr val="FFFFFF"/>
                 </a:solidFill>
@@ -5140,7 +5301,7 @@
           <a:lstStyle/>
           <a:p>
             <a:pPr algn="ctr"/>
-            <a:endParaRPr lang="en-US"/>
+            <a:endParaRPr lang="en-US" dirty="0"/>
           </a:p>
         </p:txBody>
       </p:sp>
@@ -6565,6 +6726,14 @@
 <file path=ppt/slides/slide8.xml><?xml version="1.0" encoding="utf-8"?>
 <p:sld xmlns:a="http://schemas.openxmlformats.org/drawingml/2006/main" xmlns:r="http://schemas.openxmlformats.org/officeDocument/2006/relationships" xmlns:p="http://schemas.openxmlformats.org/presentationml/2006/main">
   <p:cSld>
+    <p:bg>
+      <p:bgPr>
+        <a:solidFill>
+          <a:schemeClr val="bg1"/>
+        </a:solidFill>
+        <a:effectLst/>
+      </p:bgPr>
+    </p:bg>
     <p:spTree>
       <p:nvGrpSpPr>
         <p:cNvPr id="1" name=""/>
@@ -6579,6 +6748,121 @@
           <a:chExt cx="0" cy="0"/>
         </a:xfrm>
       </p:grpSpPr>
+      <p:sp useBgFill="1">
+        <p:nvSpPr>
+          <p:cNvPr id="8" name="Rectangle 7">
+            <a:extLst>
+              <a:ext uri="{FF2B5EF4-FFF2-40B4-BE49-F238E27FC236}">
+                <a16:creationId xmlns:a16="http://schemas.microsoft.com/office/drawing/2014/main" id="{3558DB37-9FEE-48A2-8578-ED0401573943}"/>
+              </a:ext>
+              <a:ext uri="{C183D7F6-B498-43B3-948B-1728B52AA6E4}">
+                <adec:decorative xmlns:adec="http://schemas.microsoft.com/office/drawing/2017/decorative" val="1"/>
+              </a:ext>
+            </a:extLst>
+          </p:cNvPr>
+          <p:cNvSpPr>
+            <a:spLocks noGrp="1" noRot="1" noChangeAspect="1" noMove="1" noResize="1" noEditPoints="1" noAdjustHandles="1" noChangeArrowheads="1" noChangeShapeType="1" noTextEdit="1"/>
+          </p:cNvSpPr>
+          <p:nvPr>
+            <p:extLst>
+              <p:ext uri="{386F3935-93C4-4BCD-93E2-E3B085C9AB24}">
+                <p16:designElem xmlns:p16="http://schemas.microsoft.com/office/powerpoint/2015/main" val="1"/>
+              </p:ext>
+            </p:extLst>
+          </p:nvPr>
+        </p:nvSpPr>
+        <p:spPr>
+          <a:xfrm>
+            <a:off x="1507" y="0"/>
+            <a:ext cx="12192000" cy="6858000"/>
+          </a:xfrm>
+          <a:prstGeom prst="rect">
+            <a:avLst/>
+          </a:prstGeom>
+          <a:ln>
+            <a:noFill/>
+          </a:ln>
+        </p:spPr>
+        <p:style>
+          <a:lnRef idx="2">
+            <a:schemeClr val="accent1">
+              <a:shade val="50000"/>
+            </a:schemeClr>
+          </a:lnRef>
+          <a:fillRef idx="1">
+            <a:schemeClr val="accent1"/>
+          </a:fillRef>
+          <a:effectRef idx="0">
+            <a:schemeClr val="accent1"/>
+          </a:effectRef>
+          <a:fontRef idx="minor">
+            <a:schemeClr val="lt1"/>
+          </a:fontRef>
+        </p:style>
+        <p:txBody>
+          <a:bodyPr rtlCol="0" anchor="ctr"/>
+          <a:lstStyle/>
+          <a:p>
+            <a:pPr algn="ctr"/>
+            <a:endParaRPr lang="en-US"/>
+          </a:p>
+        </p:txBody>
+      </p:sp>
+      <p:sp>
+        <p:nvSpPr>
+          <p:cNvPr id="10" name="Rectangle 9">
+            <a:extLst>
+              <a:ext uri="{FF2B5EF4-FFF2-40B4-BE49-F238E27FC236}">
+                <a16:creationId xmlns:a16="http://schemas.microsoft.com/office/drawing/2014/main" id="{5F7FCCA6-00E2-4F74-A105-0D769872F243}"/>
+              </a:ext>
+              <a:ext uri="{C183D7F6-B498-43B3-948B-1728B52AA6E4}">
+                <adec:decorative xmlns:adec="http://schemas.microsoft.com/office/drawing/2017/decorative" val="1"/>
+              </a:ext>
+            </a:extLst>
+          </p:cNvPr>
+          <p:cNvSpPr>
+            <a:spLocks noGrp="1" noRot="1" noChangeAspect="1" noMove="1" noResize="1" noEditPoints="1" noAdjustHandles="1" noChangeArrowheads="1" noChangeShapeType="1" noTextEdit="1"/>
+          </p:cNvSpPr>
+          <p:nvPr>
+            <p:extLst>
+              <p:ext uri="{386F3935-93C4-4BCD-93E2-E3B085C9AB24}">
+                <p16:designElem xmlns:p16="http://schemas.microsoft.com/office/powerpoint/2015/main" val="1"/>
+              </p:ext>
+            </p:extLst>
+          </p:nvPr>
+        </p:nvSpPr>
+        <p:spPr bwMode="white">
+          <a:xfrm>
+            <a:off x="1507" y="0"/>
+            <a:ext cx="12188952" cy="1905000"/>
+          </a:xfrm>
+          <a:prstGeom prst="rect">
+            <a:avLst/>
+          </a:prstGeom>
+          <a:solidFill>
+            <a:srgbClr val="262626"/>
+          </a:solidFill>
+          <a:ln>
+            <a:noFill/>
+          </a:ln>
+        </p:spPr>
+        <p:style>
+          <a:lnRef idx="2">
+            <a:schemeClr val="accent1">
+              <a:shade val="50000"/>
+            </a:schemeClr>
+          </a:lnRef>
+          <a:fillRef idx="1">
+            <a:schemeClr val="accent1"/>
+          </a:fillRef>
+          <a:effectRef idx="0">
+            <a:schemeClr val="accent1"/>
+          </a:effectRef>
+          <a:fontRef idx="minor">
+            <a:schemeClr val="lt1"/>
+          </a:fontRef>
+        </p:style>
+      </p:sp>
       <p:sp>
         <p:nvSpPr>
           <p:cNvPr id="2" name="Titolo 1">
@@ -6595,12 +6879,26 @@
             <p:ph type="title"/>
           </p:nvPr>
         </p:nvSpPr>
-        <p:spPr/>
-        <p:txBody>
-          <a:bodyPr/>
+        <p:spPr>
+          <a:xfrm>
+            <a:off x="1097280" y="286603"/>
+            <a:ext cx="10058400" cy="1450757"/>
+          </a:xfrm>
+        </p:spPr>
+        <p:txBody>
+          <a:bodyPr anchor="ctr">
+            <a:normAutofit/>
+          </a:bodyPr>
           <a:lstStyle/>
           <a:p>
-            <a:endParaRPr lang="it-IT"/>
+            <a:r>
+              <a:rPr lang="it-IT">
+                <a:solidFill>
+                  <a:srgbClr val="FFFFFF"/>
+                </a:solidFill>
+              </a:rPr>
+              <a:t>Aggiunta watch_next_dataset</a:t>
+            </a:r>
           </a:p>
         </p:txBody>
       </p:sp>
@@ -6620,14 +6918,366 @@
             <p:ph idx="1"/>
           </p:nvPr>
         </p:nvSpPr>
-        <p:spPr/>
-        <p:txBody>
-          <a:bodyPr/>
+        <p:spPr>
+          <a:xfrm>
+            <a:off x="352680" y="2133600"/>
+            <a:ext cx="11486606" cy="4038600"/>
+          </a:xfrm>
+        </p:spPr>
+        <p:txBody>
+          <a:bodyPr>
+            <a:normAutofit/>
+          </a:bodyPr>
           <a:lstStyle/>
           <a:p>
-            <a:endParaRPr lang="it-IT"/>
-          </a:p>
-        </p:txBody>
+            <a:pPr>
+              <a:lnSpc>
+                <a:spcPct val="100000"/>
+              </a:lnSpc>
+            </a:pPr>
+            <a:r>
+              <a:rPr lang="it-IT" sz="2400" dirty="0"/>
+              <a:t>Lo script del job pyspark è stato aggiornato con le seguenti righe di codice:</a:t>
+            </a:r>
+          </a:p>
+          <a:p>
+            <a:pPr>
+              <a:lnSpc>
+                <a:spcPct val="100000"/>
+              </a:lnSpc>
+            </a:pPr>
+            <a:r>
+              <a:rPr lang="it-IT" sz="1100" b="1" dirty="0"/>
+              <a:t>## READ WATCH_NEXT DATASET</a:t>
+            </a:r>
+          </a:p>
+          <a:p>
+            <a:pPr>
+              <a:lnSpc>
+                <a:spcPct val="100000"/>
+              </a:lnSpc>
+            </a:pPr>
+            <a:r>
+              <a:rPr lang="it-IT" sz="1100" dirty="0"/>
+              <a:t>ted_watch_next_dataset_path = "s3://pirotta-bucket-mytedx/watch_next_dataset.csv"</a:t>
+            </a:r>
+          </a:p>
+          <a:p>
+            <a:pPr>
+              <a:lnSpc>
+                <a:spcPct val="100000"/>
+              </a:lnSpc>
+            </a:pPr>
+            <a:r>
+              <a:rPr lang="it-IT" sz="1100" dirty="0" err="1"/>
+              <a:t>watch_next_dataset</a:t>
+            </a:r>
+            <a:r>
+              <a:rPr lang="it-IT" sz="1100" dirty="0"/>
+              <a:t> = </a:t>
+            </a:r>
+            <a:r>
+              <a:rPr lang="it-IT" sz="1100" dirty="0" err="1"/>
+              <a:t>spark.read.option</a:t>
+            </a:r>
+            <a:r>
+              <a:rPr lang="it-IT" sz="1100" dirty="0"/>
+              <a:t>("</a:t>
+            </a:r>
+            <a:r>
+              <a:rPr lang="it-IT" sz="1100" dirty="0" err="1"/>
+              <a:t>header</a:t>
+            </a:r>
+            <a:r>
+              <a:rPr lang="it-IT" sz="1100" dirty="0"/>
+              <a:t>","</a:t>
+            </a:r>
+            <a:r>
+              <a:rPr lang="it-IT" sz="1100" dirty="0" err="1"/>
+              <a:t>true</a:t>
+            </a:r>
+            <a:r>
+              <a:rPr lang="it-IT" sz="1100" dirty="0"/>
+              <a:t>").</a:t>
+            </a:r>
+            <a:r>
+              <a:rPr lang="it-IT" sz="1100" dirty="0" err="1"/>
+              <a:t>csv</a:t>
+            </a:r>
+            <a:r>
+              <a:rPr lang="it-IT" sz="1100" dirty="0"/>
+              <a:t>(</a:t>
+            </a:r>
+            <a:r>
+              <a:rPr lang="it-IT" sz="1100" dirty="0" err="1"/>
+              <a:t>ted_watch_next_dataset_path</a:t>
+            </a:r>
+            <a:r>
+              <a:rPr lang="it-IT" sz="1100" dirty="0"/>
+              <a:t>) </a:t>
+            </a:r>
+          </a:p>
+          <a:p>
+            <a:pPr>
+              <a:lnSpc>
+                <a:spcPct val="100000"/>
+              </a:lnSpc>
+            </a:pPr>
+            <a:r>
+              <a:rPr lang="it-IT" sz="1100" b="1" dirty="0"/>
+              <a:t># ADD WATCH_NEXT TO TEDX_DATASET</a:t>
+            </a:r>
+          </a:p>
+          <a:p>
+            <a:pPr>
+              <a:lnSpc>
+                <a:spcPct val="100000"/>
+              </a:lnSpc>
+            </a:pPr>
+            <a:r>
+              <a:rPr lang="it-IT" sz="1100" dirty="0" err="1"/>
+              <a:t>watch_next_dataset_agg</a:t>
+            </a:r>
+            <a:r>
+              <a:rPr lang="it-IT" sz="1100" dirty="0"/>
+              <a:t> =  </a:t>
+            </a:r>
+            <a:r>
+              <a:rPr lang="it-IT" sz="1100" dirty="0" err="1"/>
+              <a:t>watch_next_dataset.groupBy</a:t>
+            </a:r>
+            <a:r>
+              <a:rPr lang="it-IT" sz="1100" dirty="0"/>
+              <a:t>(col("</a:t>
+            </a:r>
+            <a:r>
+              <a:rPr lang="it-IT" sz="1100" dirty="0" err="1"/>
+              <a:t>idx</a:t>
+            </a:r>
+            <a:r>
+              <a:rPr lang="it-IT" sz="1100" dirty="0"/>
+              <a:t>").alias("idx_ref2")).</a:t>
+            </a:r>
+            <a:r>
+              <a:rPr lang="it-IT" sz="1100" dirty="0" err="1"/>
+              <a:t>agg</a:t>
+            </a:r>
+            <a:r>
+              <a:rPr lang="it-IT" sz="1100" dirty="0"/>
+              <a:t>(</a:t>
+            </a:r>
+            <a:r>
+              <a:rPr lang="it-IT" sz="1100" dirty="0" err="1"/>
+              <a:t>collect_list</a:t>
+            </a:r>
+            <a:r>
+              <a:rPr lang="it-IT" sz="1100" dirty="0"/>
+              <a:t>("</a:t>
+            </a:r>
+            <a:r>
+              <a:rPr lang="it-IT" sz="1100" dirty="0" err="1"/>
+              <a:t>url</a:t>
+            </a:r>
+            <a:r>
+              <a:rPr lang="it-IT" sz="1100" dirty="0"/>
+              <a:t>").alias("</a:t>
+            </a:r>
+            <a:r>
+              <a:rPr lang="it-IT" sz="1100" dirty="0" err="1"/>
+              <a:t>url_next</a:t>
+            </a:r>
+            <a:r>
+              <a:rPr lang="it-IT" sz="1100" dirty="0"/>
+              <a:t>"),</a:t>
+            </a:r>
+            <a:r>
+              <a:rPr lang="it-IT" sz="1100" dirty="0" err="1"/>
+              <a:t>collect_list</a:t>
+            </a:r>
+            <a:r>
+              <a:rPr lang="it-IT" sz="1100" dirty="0"/>
+              <a:t>("</a:t>
+            </a:r>
+            <a:r>
+              <a:rPr lang="it-IT" sz="1100" dirty="0" err="1"/>
+              <a:t>watch_next_idx</a:t>
+            </a:r>
+            <a:r>
+              <a:rPr lang="it-IT" sz="1100" dirty="0"/>
+              <a:t>").alias("</a:t>
+            </a:r>
+            <a:r>
+              <a:rPr lang="it-IT" sz="1100" dirty="0" err="1"/>
+              <a:t>id_next</a:t>
+            </a:r>
+            <a:r>
+              <a:rPr lang="it-IT" sz="1100" dirty="0"/>
+              <a:t>"))</a:t>
+            </a:r>
+          </a:p>
+          <a:p>
+            <a:pPr>
+              <a:lnSpc>
+                <a:spcPct val="100000"/>
+              </a:lnSpc>
+            </a:pPr>
+            <a:r>
+              <a:rPr lang="it-IT" sz="1100" dirty="0" err="1"/>
+              <a:t>watch_next_dataset_agg.printSchema</a:t>
+            </a:r>
+            <a:r>
+              <a:rPr lang="it-IT" sz="1100" dirty="0"/>
+              <a:t>()</a:t>
+            </a:r>
+          </a:p>
+          <a:p>
+            <a:pPr>
+              <a:lnSpc>
+                <a:spcPct val="100000"/>
+              </a:lnSpc>
+            </a:pPr>
+            <a:r>
+              <a:rPr lang="it-IT" sz="1100" dirty="0" err="1"/>
+              <a:t>tedx_dataset_agg</a:t>
+            </a:r>
+            <a:r>
+              <a:rPr lang="it-IT" sz="1100" dirty="0"/>
+              <a:t> = </a:t>
+            </a:r>
+            <a:r>
+              <a:rPr lang="it-IT" sz="1100" dirty="0" err="1"/>
+              <a:t>tedx_dataset_agg.join</a:t>
+            </a:r>
+            <a:r>
+              <a:rPr lang="it-IT" sz="1100" dirty="0"/>
+              <a:t>(</a:t>
+            </a:r>
+            <a:r>
+              <a:rPr lang="it-IT" sz="1100" dirty="0" err="1"/>
+              <a:t>watch_next_dataset_agg</a:t>
+            </a:r>
+            <a:r>
+              <a:rPr lang="it-IT" sz="1100" dirty="0"/>
+              <a:t>, tedx_dataset_</a:t>
+            </a:r>
+            <a:r>
+              <a:rPr lang="it-IT" sz="1100" dirty="0" err="1"/>
+              <a:t>agg</a:t>
+            </a:r>
+            <a:r>
+              <a:rPr lang="it-IT" sz="1100" dirty="0"/>
+              <a:t>._id == watch_next_dataset_agg.idx_ref2, "</a:t>
+            </a:r>
+            <a:r>
+              <a:rPr lang="it-IT" sz="1100" dirty="0" err="1"/>
+              <a:t>left</a:t>
+            </a:r>
+            <a:r>
+              <a:rPr lang="it-IT" sz="1100" dirty="0"/>
+              <a:t>") \</a:t>
+            </a:r>
+          </a:p>
+          <a:p>
+            <a:pPr>
+              <a:lnSpc>
+                <a:spcPct val="100000"/>
+              </a:lnSpc>
+            </a:pPr>
+            <a:r>
+              <a:rPr lang="it-IT" sz="1100" dirty="0"/>
+              <a:t>    .</a:t>
+            </a:r>
+            <a:r>
+              <a:rPr lang="it-IT" sz="1100" dirty="0" err="1"/>
+              <a:t>select</a:t>
+            </a:r>
+            <a:r>
+              <a:rPr lang="it-IT" sz="1100" dirty="0"/>
+              <a:t>(col("*")) \</a:t>
+            </a:r>
+          </a:p>
+          <a:p>
+            <a:pPr>
+              <a:lnSpc>
+                <a:spcPct val="100000"/>
+              </a:lnSpc>
+            </a:pPr>
+            <a:r>
+              <a:rPr lang="it-IT" sz="1100" dirty="0"/>
+              <a:t>    .drop("idx_ref2") \</a:t>
+            </a:r>
+          </a:p>
+          <a:p>
+            <a:pPr>
+              <a:lnSpc>
+                <a:spcPct val="100000"/>
+              </a:lnSpc>
+            </a:pPr>
+            <a:r>
+              <a:rPr lang="it-IT" sz="1100" dirty="0" err="1"/>
+              <a:t>tedx_dataset_agg.printSchema</a:t>
+            </a:r>
+            <a:r>
+              <a:rPr lang="it-IT" sz="1100" dirty="0"/>
+              <a:t>()</a:t>
+            </a:r>
+          </a:p>
+        </p:txBody>
+      </p:sp>
+      <p:sp>
+        <p:nvSpPr>
+          <p:cNvPr id="12" name="Rectangle 11">
+            <a:extLst>
+              <a:ext uri="{FF2B5EF4-FFF2-40B4-BE49-F238E27FC236}">
+                <a16:creationId xmlns:a16="http://schemas.microsoft.com/office/drawing/2014/main" id="{359CEC61-F44B-43B3-B40F-AE38C5AF1D5F}"/>
+              </a:ext>
+              <a:ext uri="{C183D7F6-B498-43B3-948B-1728B52AA6E4}">
+                <adec:decorative xmlns:adec="http://schemas.microsoft.com/office/drawing/2017/decorative" val="1"/>
+              </a:ext>
+            </a:extLst>
+          </p:cNvPr>
+          <p:cNvSpPr>
+            <a:spLocks noGrp="1" noRot="1" noChangeAspect="1" noMove="1" noResize="1" noEditPoints="1" noAdjustHandles="1" noChangeArrowheads="1" noChangeShapeType="1" noTextEdit="1"/>
+          </p:cNvSpPr>
+          <p:nvPr>
+            <p:extLst>
+              <p:ext uri="{386F3935-93C4-4BCD-93E2-E3B085C9AB24}">
+                <p16:designElem xmlns:p16="http://schemas.microsoft.com/office/powerpoint/2015/main" val="1"/>
+              </p:ext>
+            </p:extLst>
+          </p:nvPr>
+        </p:nvSpPr>
+        <p:spPr>
+          <a:xfrm>
+            <a:off x="0" y="6400800"/>
+            <a:ext cx="12192000" cy="457200"/>
+          </a:xfrm>
+          <a:prstGeom prst="rect">
+            <a:avLst/>
+          </a:prstGeom>
+          <a:solidFill>
+            <a:srgbClr val="262626"/>
+          </a:solidFill>
+          <a:ln>
+            <a:noFill/>
+          </a:ln>
+        </p:spPr>
+        <p:style>
+          <a:lnRef idx="2">
+            <a:schemeClr val="accent1">
+              <a:shade val="50000"/>
+            </a:schemeClr>
+          </a:lnRef>
+          <a:fillRef idx="1">
+            <a:schemeClr val="accent1"/>
+          </a:fillRef>
+          <a:effectRef idx="0">
+            <a:schemeClr val="accent1"/>
+          </a:effectRef>
+          <a:fontRef idx="minor">
+            <a:schemeClr val="lt1"/>
+          </a:fontRef>
+        </p:style>
       </p:sp>
     </p:spTree>
     <p:extLst>
@@ -6638,6 +7288,625 @@
   </p:cSld>
   <p:clrMapOvr>
     <a:masterClrMapping/>
+  </p:clrMapOvr>
+</p:sld>
+</file>
+
+<file path=ppt/slides/slide9.xml><?xml version="1.0" encoding="utf-8"?>
+<p:sld xmlns:a="http://schemas.openxmlformats.org/drawingml/2006/main" xmlns:r="http://schemas.openxmlformats.org/officeDocument/2006/relationships" xmlns:p="http://schemas.openxmlformats.org/presentationml/2006/main">
+  <p:cSld>
+    <p:bg>
+      <p:bgPr>
+        <a:solidFill>
+          <a:schemeClr val="bg1"/>
+        </a:solidFill>
+        <a:effectLst/>
+      </p:bgPr>
+    </p:bg>
+    <p:spTree>
+      <p:nvGrpSpPr>
+        <p:cNvPr id="1" name=""/>
+        <p:cNvGrpSpPr/>
+        <p:nvPr/>
+      </p:nvGrpSpPr>
+      <p:grpSpPr>
+        <a:xfrm>
+          <a:off x="0" y="0"/>
+          <a:ext cx="0" cy="0"/>
+          <a:chOff x="0" y="0"/>
+          <a:chExt cx="0" cy="0"/>
+        </a:xfrm>
+      </p:grpSpPr>
+      <p:sp>
+        <p:nvSpPr>
+          <p:cNvPr id="73" name="Rectangle 72">
+            <a:extLst>
+              <a:ext uri="{FF2B5EF4-FFF2-40B4-BE49-F238E27FC236}">
+                <a16:creationId xmlns:a16="http://schemas.microsoft.com/office/drawing/2014/main" id="{E844E128-FF69-4E9F-8327-6B504B3C5AE1}"/>
+              </a:ext>
+              <a:ext uri="{C183D7F6-B498-43B3-948B-1728B52AA6E4}">
+                <adec:decorative xmlns:adec="http://schemas.microsoft.com/office/drawing/2017/decorative" val="1"/>
+              </a:ext>
+            </a:extLst>
+          </p:cNvPr>
+          <p:cNvSpPr>
+            <a:spLocks noGrp="1" noRot="1" noChangeAspect="1" noMove="1" noResize="1" noEditPoints="1" noAdjustHandles="1" noChangeArrowheads="1" noChangeShapeType="1" noTextEdit="1"/>
+          </p:cNvSpPr>
+          <p:nvPr>
+            <p:extLst>
+              <p:ext uri="{386F3935-93C4-4BCD-93E2-E3B085C9AB24}">
+                <p16:designElem xmlns:p16="http://schemas.microsoft.com/office/powerpoint/2015/main" val="1"/>
+              </p:ext>
+            </p:extLst>
+          </p:nvPr>
+        </p:nvSpPr>
+        <p:spPr bwMode="white">
+          <a:xfrm>
+            <a:off x="15" y="0"/>
+            <a:ext cx="12191985" cy="6858000"/>
+          </a:xfrm>
+          <a:prstGeom prst="rect">
+            <a:avLst/>
+          </a:prstGeom>
+          <a:solidFill>
+            <a:srgbClr val="262626"/>
+          </a:solidFill>
+          <a:ln>
+            <a:noFill/>
+          </a:ln>
+        </p:spPr>
+        <p:style>
+          <a:lnRef idx="2">
+            <a:schemeClr val="accent1">
+              <a:shade val="50000"/>
+            </a:schemeClr>
+          </a:lnRef>
+          <a:fillRef idx="1">
+            <a:schemeClr val="accent1"/>
+          </a:fillRef>
+          <a:effectRef idx="0">
+            <a:schemeClr val="accent1"/>
+          </a:effectRef>
+          <a:fontRef idx="minor">
+            <a:schemeClr val="lt1"/>
+          </a:fontRef>
+        </p:style>
+      </p:sp>
+      <p:sp>
+        <p:nvSpPr>
+          <p:cNvPr id="2" name="Titolo 1">
+            <a:extLst>
+              <a:ext uri="{FF2B5EF4-FFF2-40B4-BE49-F238E27FC236}">
+                <a16:creationId xmlns:a16="http://schemas.microsoft.com/office/drawing/2014/main" id="{E324B6B2-A860-495F-939E-552F7B7A44A7}"/>
+              </a:ext>
+            </a:extLst>
+          </p:cNvPr>
+          <p:cNvSpPr>
+            <a:spLocks noGrp="1"/>
+          </p:cNvSpPr>
+          <p:nvPr>
+            <p:ph type="title"/>
+          </p:nvPr>
+        </p:nvSpPr>
+        <p:spPr>
+          <a:xfrm>
+            <a:off x="1097279" y="633677"/>
+            <a:ext cx="5977937" cy="1278870"/>
+          </a:xfrm>
+        </p:spPr>
+        <p:txBody>
+          <a:bodyPr>
+            <a:normAutofit/>
+          </a:bodyPr>
+          <a:lstStyle/>
+          <a:p>
+            <a:r>
+              <a:rPr lang="it-IT" sz="4000" dirty="0">
+                <a:solidFill>
+                  <a:srgbClr val="FFFFFF"/>
+                </a:solidFill>
+              </a:rPr>
+              <a:t>Collection risultante</a:t>
+            </a:r>
+          </a:p>
+        </p:txBody>
+      </p:sp>
+      <p:cxnSp>
+        <p:nvCxnSpPr>
+          <p:cNvPr id="75" name="Straight Connector 74">
+            <a:extLst>
+              <a:ext uri="{FF2B5EF4-FFF2-40B4-BE49-F238E27FC236}">
+                <a16:creationId xmlns:a16="http://schemas.microsoft.com/office/drawing/2014/main" id="{055CEADF-09EA-423C-8C45-F94AF44D5AF0}"/>
+              </a:ext>
+              <a:ext uri="{C183D7F6-B498-43B3-948B-1728B52AA6E4}">
+                <adec:decorative xmlns:adec="http://schemas.microsoft.com/office/drawing/2017/decorative" val="1"/>
+              </a:ext>
+            </a:extLst>
+          </p:cNvPr>
+          <p:cNvCxnSpPr>
+            <a:cxnSpLocks noGrp="1" noRot="1" noChangeAspect="1" noMove="1" noResize="1" noEditPoints="1" noAdjustHandles="1" noChangeArrowheads="1" noChangeShapeType="1"/>
+          </p:cNvCxnSpPr>
+          <p:nvPr>
+            <p:extLst>
+              <p:ext uri="{386F3935-93C4-4BCD-93E2-E3B085C9AB24}">
+                <p16:designElem xmlns:p16="http://schemas.microsoft.com/office/powerpoint/2015/main" val="1"/>
+              </p:ext>
+            </p:extLst>
+          </p:nvPr>
+        </p:nvCxnSpPr>
+        <p:spPr>
+          <a:xfrm>
+            <a:off x="1215896" y="2353592"/>
+            <a:ext cx="5303520" cy="0"/>
+          </a:xfrm>
+          <a:prstGeom prst="line">
+            <a:avLst/>
+          </a:prstGeom>
+          <a:ln w="19050">
+            <a:solidFill>
+              <a:schemeClr val="accent1"/>
+            </a:solidFill>
+          </a:ln>
+        </p:spPr>
+        <p:style>
+          <a:lnRef idx="1">
+            <a:schemeClr val="accent1"/>
+          </a:lnRef>
+          <a:fillRef idx="0">
+            <a:schemeClr val="accent1"/>
+          </a:fillRef>
+          <a:effectRef idx="0">
+            <a:schemeClr val="accent1"/>
+          </a:effectRef>
+          <a:fontRef idx="minor">
+            <a:schemeClr val="tx1"/>
+          </a:fontRef>
+        </p:style>
+      </p:cxnSp>
+      <p:sp>
+        <p:nvSpPr>
+          <p:cNvPr id="3" name="Segnaposto contenuto 2">
+            <a:extLst>
+              <a:ext uri="{FF2B5EF4-FFF2-40B4-BE49-F238E27FC236}">
+                <a16:creationId xmlns:a16="http://schemas.microsoft.com/office/drawing/2014/main" id="{EAC4FBFE-623C-48DE-8B8B-C72C826295FE}"/>
+              </a:ext>
+            </a:extLst>
+          </p:cNvPr>
+          <p:cNvSpPr>
+            <a:spLocks noGrp="1"/>
+          </p:cNvSpPr>
+          <p:nvPr>
+            <p:ph idx="1"/>
+          </p:nvPr>
+        </p:nvSpPr>
+        <p:spPr>
+          <a:xfrm>
+            <a:off x="1097279" y="2546224"/>
+            <a:ext cx="6514622" cy="4311775"/>
+          </a:xfrm>
+        </p:spPr>
+        <p:txBody>
+          <a:bodyPr>
+            <a:normAutofit fontScale="85000" lnSpcReduction="20000"/>
+          </a:bodyPr>
+          <a:lstStyle/>
+          <a:p>
+            <a:pPr>
+              <a:lnSpc>
+                <a:spcPct val="90000"/>
+              </a:lnSpc>
+            </a:pPr>
+            <a:r>
+              <a:rPr lang="it-IT" sz="2800" dirty="0">
+                <a:solidFill>
+                  <a:srgbClr val="FFFFFF"/>
+                </a:solidFill>
+              </a:rPr>
+              <a:t>Lo script è stato modificato al fine di eseguire un ulteriore join con il dataset contenente i video consigliati. Lo schema risultante in </a:t>
+            </a:r>
+            <a:r>
+              <a:rPr lang="it-IT" sz="2800" dirty="0" err="1">
+                <a:solidFill>
+                  <a:srgbClr val="FFFFFF"/>
+                </a:solidFill>
+              </a:rPr>
+              <a:t>MongoDB</a:t>
+            </a:r>
+            <a:r>
+              <a:rPr lang="it-IT" sz="2800" dirty="0">
+                <a:solidFill>
+                  <a:srgbClr val="FFFFFF"/>
+                </a:solidFill>
+              </a:rPr>
+              <a:t> è il seguente:</a:t>
+            </a:r>
+          </a:p>
+          <a:p>
+            <a:pPr>
+              <a:lnSpc>
+                <a:spcPct val="90000"/>
+              </a:lnSpc>
+            </a:pPr>
+            <a:endParaRPr lang="it-IT" sz="1400" dirty="0">
+              <a:solidFill>
+                <a:srgbClr val="FF0000"/>
+              </a:solidFill>
+            </a:endParaRPr>
+          </a:p>
+          <a:p>
+            <a:pPr marL="201168" lvl="1" indent="0">
+              <a:lnSpc>
+                <a:spcPct val="90000"/>
+              </a:lnSpc>
+              <a:buNone/>
+            </a:pPr>
+            <a:r>
+              <a:rPr lang="it-IT" sz="2200" i="1" dirty="0">
+                <a:solidFill>
+                  <a:srgbClr val="92D050"/>
+                </a:solidFill>
+              </a:rPr>
+              <a:t>_id:                                          </a:t>
+            </a:r>
+            <a:r>
+              <a:rPr lang="it-IT" sz="2200" dirty="0">
+                <a:solidFill>
+                  <a:schemeClr val="tx2"/>
+                </a:solidFill>
+              </a:rPr>
+              <a:t>id del video in riproduzione</a:t>
+            </a:r>
+            <a:endParaRPr lang="it-IT" sz="2200" i="1" dirty="0">
+              <a:solidFill>
+                <a:srgbClr val="92D050"/>
+              </a:solidFill>
+            </a:endParaRPr>
+          </a:p>
+          <a:p>
+            <a:pPr marL="201168" lvl="1" indent="0">
+              <a:lnSpc>
+                <a:spcPct val="90000"/>
+              </a:lnSpc>
+              <a:buNone/>
+            </a:pPr>
+            <a:r>
+              <a:rPr lang="it-IT" sz="2200" i="1" dirty="0" err="1">
+                <a:solidFill>
+                  <a:srgbClr val="92D050"/>
+                </a:solidFill>
+              </a:rPr>
+              <a:t>main_speaker</a:t>
+            </a:r>
+            <a:r>
+              <a:rPr lang="it-IT" sz="2200" i="1" dirty="0">
+                <a:solidFill>
+                  <a:srgbClr val="92D050"/>
+                </a:solidFill>
+              </a:rPr>
+              <a:t>:                  </a:t>
+            </a:r>
+            <a:r>
+              <a:rPr lang="it-IT" sz="2200" dirty="0">
+                <a:solidFill>
+                  <a:schemeClr val="tx2"/>
+                </a:solidFill>
+              </a:rPr>
+              <a:t>relatore del talk in riproduzione</a:t>
+            </a:r>
+            <a:endParaRPr lang="it-IT" sz="2200" i="1" dirty="0">
+              <a:solidFill>
+                <a:srgbClr val="92D050"/>
+              </a:solidFill>
+            </a:endParaRPr>
+          </a:p>
+          <a:p>
+            <a:pPr marL="201168" lvl="1" indent="0">
+              <a:lnSpc>
+                <a:spcPct val="90000"/>
+              </a:lnSpc>
+              <a:buNone/>
+            </a:pPr>
+            <a:r>
+              <a:rPr lang="it-IT" sz="2200" i="1" dirty="0" err="1">
+                <a:solidFill>
+                  <a:srgbClr val="92D050"/>
+                </a:solidFill>
+              </a:rPr>
+              <a:t>details</a:t>
+            </a:r>
+            <a:r>
+              <a:rPr lang="it-IT" sz="2200" i="1" dirty="0">
+                <a:solidFill>
+                  <a:srgbClr val="92D050"/>
+                </a:solidFill>
+              </a:rPr>
+              <a:t>:                            </a:t>
+            </a:r>
+            <a:r>
+              <a:rPr lang="it-IT" sz="2200" dirty="0">
+                <a:solidFill>
+                  <a:schemeClr val="tx2"/>
+                </a:solidFill>
+              </a:rPr>
+              <a:t>dettagli sul video in riproduzione</a:t>
+            </a:r>
+            <a:endParaRPr lang="it-IT" sz="2200" i="1" dirty="0">
+              <a:solidFill>
+                <a:srgbClr val="92D050"/>
+              </a:solidFill>
+            </a:endParaRPr>
+          </a:p>
+          <a:p>
+            <a:pPr marL="201168" lvl="1" indent="0">
+              <a:lnSpc>
+                <a:spcPct val="90000"/>
+              </a:lnSpc>
+              <a:buNone/>
+            </a:pPr>
+            <a:r>
+              <a:rPr lang="it-IT" sz="2200" i="1" dirty="0" err="1">
+                <a:solidFill>
+                  <a:srgbClr val="92D050"/>
+                </a:solidFill>
+              </a:rPr>
+              <a:t>posted</a:t>
+            </a:r>
+            <a:r>
+              <a:rPr lang="it-IT" sz="2200" i="1" dirty="0">
+                <a:solidFill>
+                  <a:srgbClr val="92D050"/>
+                </a:solidFill>
+              </a:rPr>
+              <a:t>:    </a:t>
+            </a:r>
+            <a:r>
+              <a:rPr lang="it-IT" sz="2200" dirty="0">
+                <a:solidFill>
+                  <a:schemeClr val="tx2"/>
+                </a:solidFill>
+              </a:rPr>
+              <a:t>data di pubblicazione del video in riproduzione</a:t>
+            </a:r>
+            <a:endParaRPr lang="it-IT" sz="2200" dirty="0">
+              <a:solidFill>
+                <a:srgbClr val="92D050"/>
+              </a:solidFill>
+            </a:endParaRPr>
+          </a:p>
+          <a:p>
+            <a:pPr marL="201168" lvl="1" indent="0">
+              <a:lnSpc>
+                <a:spcPct val="90000"/>
+              </a:lnSpc>
+              <a:buNone/>
+            </a:pPr>
+            <a:r>
+              <a:rPr lang="it-IT" sz="2200" i="1" dirty="0">
+                <a:solidFill>
+                  <a:srgbClr val="92D050"/>
+                </a:solidFill>
+              </a:rPr>
+              <a:t>url:                                          </a:t>
+            </a:r>
+            <a:r>
+              <a:rPr lang="it-IT" sz="2200" dirty="0" err="1">
+                <a:solidFill>
+                  <a:schemeClr val="tx2"/>
+                </a:solidFill>
+              </a:rPr>
+              <a:t>url</a:t>
+            </a:r>
+            <a:r>
+              <a:rPr lang="it-IT" sz="2200" dirty="0">
+                <a:solidFill>
+                  <a:schemeClr val="tx2"/>
+                </a:solidFill>
+              </a:rPr>
+              <a:t> del video in riproduzione</a:t>
+            </a:r>
+            <a:endParaRPr lang="it-IT" sz="2200" i="1" dirty="0">
+              <a:solidFill>
+                <a:srgbClr val="92D050"/>
+              </a:solidFill>
+            </a:endParaRPr>
+          </a:p>
+          <a:p>
+            <a:pPr marL="0" indent="0">
+              <a:lnSpc>
+                <a:spcPct val="90000"/>
+              </a:lnSpc>
+              <a:buNone/>
+            </a:pPr>
+            <a:r>
+              <a:rPr lang="it-IT" sz="2200" i="1" dirty="0">
+                <a:solidFill>
+                  <a:srgbClr val="92D050"/>
+                </a:solidFill>
+              </a:rPr>
+              <a:t>&gt; tags: Array                           </a:t>
+            </a:r>
+            <a:r>
+              <a:rPr lang="it-IT" sz="2200" dirty="0">
+                <a:solidFill>
+                  <a:schemeClr val="tx2"/>
+                </a:solidFill>
+              </a:rPr>
+              <a:t>tags del video in riproduzione</a:t>
+            </a:r>
+            <a:endParaRPr lang="it-IT" sz="2200" i="1" dirty="0">
+              <a:solidFill>
+                <a:srgbClr val="92D050"/>
+              </a:solidFill>
+            </a:endParaRPr>
+          </a:p>
+          <a:p>
+            <a:pPr marL="0" indent="0">
+              <a:lnSpc>
+                <a:spcPct val="90000"/>
+              </a:lnSpc>
+              <a:buNone/>
+            </a:pPr>
+            <a:r>
+              <a:rPr lang="it-IT" sz="2200" i="1" dirty="0">
+                <a:solidFill>
+                  <a:srgbClr val="92D050"/>
+                </a:solidFill>
+              </a:rPr>
+              <a:t>&gt; </a:t>
+            </a:r>
+            <a:r>
+              <a:rPr lang="it-IT" sz="2200" i="1" dirty="0" err="1">
+                <a:solidFill>
+                  <a:srgbClr val="92D050"/>
+                </a:solidFill>
+              </a:rPr>
+              <a:t>url_next</a:t>
+            </a:r>
+            <a:r>
+              <a:rPr lang="it-IT" sz="2200" i="1" dirty="0">
+                <a:solidFill>
+                  <a:srgbClr val="92D050"/>
+                </a:solidFill>
+              </a:rPr>
+              <a:t>: Array                                </a:t>
+            </a:r>
+            <a:r>
+              <a:rPr lang="it-IT" sz="2200" dirty="0" err="1">
+                <a:solidFill>
+                  <a:schemeClr val="tx2"/>
+                </a:solidFill>
+              </a:rPr>
+              <a:t>url</a:t>
+            </a:r>
+            <a:r>
+              <a:rPr lang="it-IT" sz="2200" dirty="0">
+                <a:solidFill>
+                  <a:schemeClr val="tx2"/>
+                </a:solidFill>
+              </a:rPr>
+              <a:t> dei video consigliati</a:t>
+            </a:r>
+            <a:endParaRPr lang="it-IT" sz="2200" i="1" dirty="0">
+              <a:solidFill>
+                <a:srgbClr val="92D050"/>
+              </a:solidFill>
+            </a:endParaRPr>
+          </a:p>
+          <a:p>
+            <a:pPr marL="0" indent="0">
+              <a:lnSpc>
+                <a:spcPct val="90000"/>
+              </a:lnSpc>
+              <a:buNone/>
+            </a:pPr>
+            <a:r>
+              <a:rPr lang="it-IT" sz="2200" i="1" dirty="0">
+                <a:solidFill>
+                  <a:srgbClr val="92D050"/>
+                </a:solidFill>
+              </a:rPr>
+              <a:t>&gt; </a:t>
+            </a:r>
+            <a:r>
+              <a:rPr lang="it-IT" sz="2200" i="1" dirty="0" err="1">
+                <a:solidFill>
+                  <a:srgbClr val="92D050"/>
+                </a:solidFill>
+              </a:rPr>
+              <a:t>id_next</a:t>
+            </a:r>
+            <a:r>
+              <a:rPr lang="it-IT" sz="2200" i="1" dirty="0">
+                <a:solidFill>
+                  <a:srgbClr val="92D050"/>
+                </a:solidFill>
+              </a:rPr>
+              <a:t>: Array                                  </a:t>
+            </a:r>
+            <a:r>
+              <a:rPr lang="it-IT" sz="2200" dirty="0">
+                <a:solidFill>
+                  <a:schemeClr val="tx2"/>
+                </a:solidFill>
+              </a:rPr>
+              <a:t>id dei video consigliati</a:t>
+            </a:r>
+            <a:endParaRPr lang="it-IT" sz="2200" i="1" dirty="0">
+              <a:solidFill>
+                <a:srgbClr val="92D050"/>
+              </a:solidFill>
+            </a:endParaRPr>
+          </a:p>
+          <a:p>
+            <a:pPr>
+              <a:lnSpc>
+                <a:spcPct val="90000"/>
+              </a:lnSpc>
+              <a:buFont typeface="Wingdings" panose="05000000000000000000" pitchFamily="2" charset="2"/>
+              <a:buChar char="Ø"/>
+            </a:pPr>
+            <a:endParaRPr lang="it-IT" sz="1400" dirty="0">
+              <a:solidFill>
+                <a:srgbClr val="FFFFFF"/>
+              </a:solidFill>
+            </a:endParaRPr>
+          </a:p>
+        </p:txBody>
+      </p:sp>
+      <p:pic>
+        <p:nvPicPr>
+          <p:cNvPr id="1028" name="Picture 4" descr="Icon Mongodb Logo, HD Png Download , Transparent Png Image - PNGitem">
+            <a:extLst>
+              <a:ext uri="{FF2B5EF4-FFF2-40B4-BE49-F238E27FC236}">
+                <a16:creationId xmlns:a16="http://schemas.microsoft.com/office/drawing/2014/main" id="{9382FCAD-6E4E-424F-A2B4-7D1CE84E21B4}"/>
+              </a:ext>
+            </a:extLst>
+          </p:cNvPr>
+          <p:cNvPicPr>
+            <a:picLocks noChangeAspect="1" noChangeArrowheads="1"/>
+          </p:cNvPicPr>
+          <p:nvPr/>
+        </p:nvPicPr>
+        <p:blipFill rotWithShape="1">
+          <a:blip r:embed="rId2">
+            <a:extLst>
+              <a:ext uri="{28A0092B-C50C-407E-A947-70E740481C1C}">
+                <a14:useLocalDpi xmlns:a14="http://schemas.microsoft.com/office/drawing/2010/main" val="0"/>
+              </a:ext>
+            </a:extLst>
+          </a:blip>
+          <a:srcRect l="6801" r="7303"/>
+          <a:stretch/>
+        </p:blipFill>
+        <p:spPr bwMode="auto">
+          <a:xfrm>
+            <a:off x="8475133" y="10"/>
+            <a:ext cx="3716866" cy="6857990"/>
+          </a:xfrm>
+          <a:prstGeom prst="rect">
+            <a:avLst/>
+          </a:prstGeom>
+          <a:noFill/>
+          <a:extLst>
+            <a:ext uri="{909E8E84-426E-40DD-AFC4-6F175D3DCCD1}">
+              <a14:hiddenFill xmlns:a14="http://schemas.microsoft.com/office/drawing/2010/main">
+                <a:solidFill>
+                  <a:srgbClr val="FFFFFF"/>
+                </a:solidFill>
+              </a14:hiddenFill>
+            </a:ext>
+          </a:extLst>
+        </p:spPr>
+      </p:pic>
+    </p:spTree>
+    <p:extLst>
+      <p:ext uri="{BB962C8B-B14F-4D97-AF65-F5344CB8AC3E}">
+        <p14:creationId xmlns:p14="http://schemas.microsoft.com/office/powerpoint/2010/main" val="3320080899"/>
+      </p:ext>
+    </p:extLst>
+  </p:cSld>
+  <p:clrMapOvr>
+    <a:overrideClrMapping bg1="dk1" tx1="lt1" bg2="dk2" tx2="lt2" accent1="accent1" accent2="accent2" accent3="accent3" accent4="accent4" accent5="accent5" accent6="accent6" hlink="hlink" folHlink="folHlink"/>
   </p:clrMapOvr>
 </p:sld>
 </file>

</xml_diff>

<commit_message>
pdf and ppt updated
</commit_message>
<xml_diff>
--- a/Preparation files/MyTEDx_Presentazione.pptx
+++ b/Preparation files/MyTEDx_Presentazione.pptx
@@ -4,6 +4,9 @@
   <p:sldMasterIdLst>
     <p:sldMasterId id="2147483687" r:id="rId1"/>
   </p:sldMasterIdLst>
+  <p:notesMasterIdLst>
+    <p:notesMasterId r:id="rId18"/>
+  </p:notesMasterIdLst>
   <p:sldIdLst>
     <p:sldId id="262" r:id="rId2"/>
     <p:sldId id="257" r:id="rId3"/>
@@ -20,6 +23,7 @@
     <p:sldId id="270" r:id="rId14"/>
     <p:sldId id="271" r:id="rId15"/>
     <p:sldId id="272" r:id="rId16"/>
+    <p:sldId id="273" r:id="rId17"/>
   </p:sldIdLst>
   <p:sldSz cx="12192000" cy="6858000"/>
   <p:notesSz cx="6858000" cy="9144000"/>
@@ -5646,6 +5650,439 @@
 </dgm:styleDef>
 </file>
 
+<file path=ppt/notesMasters/notesMaster1.xml><?xml version="1.0" encoding="utf-8"?>
+<p:notesMaster xmlns:a="http://schemas.openxmlformats.org/drawingml/2006/main" xmlns:r="http://schemas.openxmlformats.org/officeDocument/2006/relationships" xmlns:p="http://schemas.openxmlformats.org/presentationml/2006/main">
+  <p:cSld>
+    <p:bg>
+      <p:bgRef idx="1001">
+        <a:schemeClr val="bg1"/>
+      </p:bgRef>
+    </p:bg>
+    <p:spTree>
+      <p:nvGrpSpPr>
+        <p:cNvPr id="1" name=""/>
+        <p:cNvGrpSpPr/>
+        <p:nvPr/>
+      </p:nvGrpSpPr>
+      <p:grpSpPr>
+        <a:xfrm>
+          <a:off x="0" y="0"/>
+          <a:ext cx="0" cy="0"/>
+          <a:chOff x="0" y="0"/>
+          <a:chExt cx="0" cy="0"/>
+        </a:xfrm>
+      </p:grpSpPr>
+      <p:sp>
+        <p:nvSpPr>
+          <p:cNvPr id="2" name="Segnaposto intestazione 1"/>
+          <p:cNvSpPr>
+            <a:spLocks noGrp="1"/>
+          </p:cNvSpPr>
+          <p:nvPr>
+            <p:ph type="hdr" sz="quarter"/>
+          </p:nvPr>
+        </p:nvSpPr>
+        <p:spPr>
+          <a:xfrm>
+            <a:off x="0" y="0"/>
+            <a:ext cx="2971800" cy="458788"/>
+          </a:xfrm>
+          <a:prstGeom prst="rect">
+            <a:avLst/>
+          </a:prstGeom>
+        </p:spPr>
+        <p:txBody>
+          <a:bodyPr vert="horz" lIns="91440" tIns="45720" rIns="91440" bIns="45720" rtlCol="0"/>
+          <a:lstStyle>
+            <a:lvl1pPr algn="l">
+              <a:defRPr sz="1200"/>
+            </a:lvl1pPr>
+          </a:lstStyle>
+          <a:p>
+            <a:endParaRPr lang="it-IT"/>
+          </a:p>
+        </p:txBody>
+      </p:sp>
+      <p:sp>
+        <p:nvSpPr>
+          <p:cNvPr id="3" name="Segnaposto data 2"/>
+          <p:cNvSpPr>
+            <a:spLocks noGrp="1"/>
+          </p:cNvSpPr>
+          <p:nvPr>
+            <p:ph type="dt" idx="1"/>
+          </p:nvPr>
+        </p:nvSpPr>
+        <p:spPr>
+          <a:xfrm>
+            <a:off x="3884613" y="0"/>
+            <a:ext cx="2971800" cy="458788"/>
+          </a:xfrm>
+          <a:prstGeom prst="rect">
+            <a:avLst/>
+          </a:prstGeom>
+        </p:spPr>
+        <p:txBody>
+          <a:bodyPr vert="horz" lIns="91440" tIns="45720" rIns="91440" bIns="45720" rtlCol="0"/>
+          <a:lstStyle>
+            <a:lvl1pPr algn="r">
+              <a:defRPr sz="1200"/>
+            </a:lvl1pPr>
+          </a:lstStyle>
+          <a:p>
+            <a:fld id="{64ABFEB1-83FF-9242-9208-739175CF7C33}" type="datetimeFigureOut">
+              <a:rPr lang="it-IT" smtClean="0"/>
+              <a:t>27/05/2020</a:t>
+            </a:fld>
+            <a:endParaRPr lang="it-IT"/>
+          </a:p>
+        </p:txBody>
+      </p:sp>
+      <p:sp>
+        <p:nvSpPr>
+          <p:cNvPr id="4" name="Segnaposto immagine diapositiva 3"/>
+          <p:cNvSpPr>
+            <a:spLocks noGrp="1" noRot="1" noChangeAspect="1"/>
+          </p:cNvSpPr>
+          <p:nvPr>
+            <p:ph type="sldImg" idx="2"/>
+          </p:nvPr>
+        </p:nvSpPr>
+        <p:spPr>
+          <a:xfrm>
+            <a:off x="685800" y="1143000"/>
+            <a:ext cx="5486400" cy="3086100"/>
+          </a:xfrm>
+          <a:prstGeom prst="rect">
+            <a:avLst/>
+          </a:prstGeom>
+          <a:noFill/>
+          <a:ln w="12700">
+            <a:solidFill>
+              <a:prstClr val="black"/>
+            </a:solidFill>
+          </a:ln>
+        </p:spPr>
+        <p:txBody>
+          <a:bodyPr vert="horz" lIns="91440" tIns="45720" rIns="91440" bIns="45720" rtlCol="0" anchor="ctr"/>
+          <a:lstStyle/>
+          <a:p>
+            <a:endParaRPr lang="it-IT"/>
+          </a:p>
+        </p:txBody>
+      </p:sp>
+      <p:sp>
+        <p:nvSpPr>
+          <p:cNvPr id="5" name="Segnaposto note 4"/>
+          <p:cNvSpPr>
+            <a:spLocks noGrp="1"/>
+          </p:cNvSpPr>
+          <p:nvPr>
+            <p:ph type="body" sz="quarter" idx="3"/>
+          </p:nvPr>
+        </p:nvSpPr>
+        <p:spPr>
+          <a:xfrm>
+            <a:off x="685800" y="4400550"/>
+            <a:ext cx="5486400" cy="3600450"/>
+          </a:xfrm>
+          <a:prstGeom prst="rect">
+            <a:avLst/>
+          </a:prstGeom>
+        </p:spPr>
+        <p:txBody>
+          <a:bodyPr vert="horz" lIns="91440" tIns="45720" rIns="91440" bIns="45720" rtlCol="0"/>
+          <a:lstStyle/>
+          <a:p>
+            <a:pPr lvl="0"/>
+            <a:r>
+              <a:rPr lang="it-IT"/>
+              <a:t>Fare clic per modificare gli stili del testo dello schema</a:t>
+            </a:r>
+          </a:p>
+          <a:p>
+            <a:pPr lvl="1"/>
+            <a:r>
+              <a:rPr lang="it-IT"/>
+              <a:t>Secondo livello</a:t>
+            </a:r>
+          </a:p>
+          <a:p>
+            <a:pPr lvl="2"/>
+            <a:r>
+              <a:rPr lang="it-IT"/>
+              <a:t>Terzo livello</a:t>
+            </a:r>
+          </a:p>
+          <a:p>
+            <a:pPr lvl="3"/>
+            <a:r>
+              <a:rPr lang="it-IT"/>
+              <a:t>Quarto livello</a:t>
+            </a:r>
+          </a:p>
+          <a:p>
+            <a:pPr lvl="4"/>
+            <a:r>
+              <a:rPr lang="it-IT"/>
+              <a:t>Quinto livello</a:t>
+            </a:r>
+          </a:p>
+        </p:txBody>
+      </p:sp>
+      <p:sp>
+        <p:nvSpPr>
+          <p:cNvPr id="6" name="Segnaposto piè di pagina 5"/>
+          <p:cNvSpPr>
+            <a:spLocks noGrp="1"/>
+          </p:cNvSpPr>
+          <p:nvPr>
+            <p:ph type="ftr" sz="quarter" idx="4"/>
+          </p:nvPr>
+        </p:nvSpPr>
+        <p:spPr>
+          <a:xfrm>
+            <a:off x="0" y="8685213"/>
+            <a:ext cx="2971800" cy="458787"/>
+          </a:xfrm>
+          <a:prstGeom prst="rect">
+            <a:avLst/>
+          </a:prstGeom>
+        </p:spPr>
+        <p:txBody>
+          <a:bodyPr vert="horz" lIns="91440" tIns="45720" rIns="91440" bIns="45720" rtlCol="0" anchor="b"/>
+          <a:lstStyle>
+            <a:lvl1pPr algn="l">
+              <a:defRPr sz="1200"/>
+            </a:lvl1pPr>
+          </a:lstStyle>
+          <a:p>
+            <a:endParaRPr lang="it-IT"/>
+          </a:p>
+        </p:txBody>
+      </p:sp>
+      <p:sp>
+        <p:nvSpPr>
+          <p:cNvPr id="7" name="Segnaposto numero diapositiva 6"/>
+          <p:cNvSpPr>
+            <a:spLocks noGrp="1"/>
+          </p:cNvSpPr>
+          <p:nvPr>
+            <p:ph type="sldNum" sz="quarter" idx="5"/>
+          </p:nvPr>
+        </p:nvSpPr>
+        <p:spPr>
+          <a:xfrm>
+            <a:off x="3884613" y="8685213"/>
+            <a:ext cx="2971800" cy="458787"/>
+          </a:xfrm>
+          <a:prstGeom prst="rect">
+            <a:avLst/>
+          </a:prstGeom>
+        </p:spPr>
+        <p:txBody>
+          <a:bodyPr vert="horz" lIns="91440" tIns="45720" rIns="91440" bIns="45720" rtlCol="0" anchor="b"/>
+          <a:lstStyle>
+            <a:lvl1pPr algn="r">
+              <a:defRPr sz="1200"/>
+            </a:lvl1pPr>
+          </a:lstStyle>
+          <a:p>
+            <a:fld id="{DDE424C1-00E5-0640-A88A-910797F4686B}" type="slidenum">
+              <a:rPr lang="it-IT" smtClean="0"/>
+              <a:t>‹N›</a:t>
+            </a:fld>
+            <a:endParaRPr lang="it-IT"/>
+          </a:p>
+        </p:txBody>
+      </p:sp>
+    </p:spTree>
+    <p:extLst>
+      <p:ext uri="{BB962C8B-B14F-4D97-AF65-F5344CB8AC3E}">
+        <p14:creationId xmlns:p14="http://schemas.microsoft.com/office/powerpoint/2010/main" val="1878001126"/>
+      </p:ext>
+    </p:extLst>
+  </p:cSld>
+  <p:clrMap bg1="lt1" tx1="dk1" bg2="lt2" tx2="dk2" accent1="accent1" accent2="accent2" accent3="accent3" accent4="accent4" accent5="accent5" accent6="accent6" hlink="hlink" folHlink="folHlink"/>
+  <p:notesStyle>
+    <a:lvl1pPr marL="0" algn="l" defTabSz="914400" rtl="0" eaLnBrk="1" latinLnBrk="0" hangingPunct="1">
+      <a:defRPr sz="1200" kern="1200">
+        <a:solidFill>
+          <a:schemeClr val="tx1"/>
+        </a:solidFill>
+        <a:latin typeface="+mn-lt"/>
+        <a:ea typeface="+mn-ea"/>
+        <a:cs typeface="+mn-cs"/>
+      </a:defRPr>
+    </a:lvl1pPr>
+    <a:lvl2pPr marL="457200" algn="l" defTabSz="914400" rtl="0" eaLnBrk="1" latinLnBrk="0" hangingPunct="1">
+      <a:defRPr sz="1200" kern="1200">
+        <a:solidFill>
+          <a:schemeClr val="tx1"/>
+        </a:solidFill>
+        <a:latin typeface="+mn-lt"/>
+        <a:ea typeface="+mn-ea"/>
+        <a:cs typeface="+mn-cs"/>
+      </a:defRPr>
+    </a:lvl2pPr>
+    <a:lvl3pPr marL="914400" algn="l" defTabSz="914400" rtl="0" eaLnBrk="1" latinLnBrk="0" hangingPunct="1">
+      <a:defRPr sz="1200" kern="1200">
+        <a:solidFill>
+          <a:schemeClr val="tx1"/>
+        </a:solidFill>
+        <a:latin typeface="+mn-lt"/>
+        <a:ea typeface="+mn-ea"/>
+        <a:cs typeface="+mn-cs"/>
+      </a:defRPr>
+    </a:lvl3pPr>
+    <a:lvl4pPr marL="1371600" algn="l" defTabSz="914400" rtl="0" eaLnBrk="1" latinLnBrk="0" hangingPunct="1">
+      <a:defRPr sz="1200" kern="1200">
+        <a:solidFill>
+          <a:schemeClr val="tx1"/>
+        </a:solidFill>
+        <a:latin typeface="+mn-lt"/>
+        <a:ea typeface="+mn-ea"/>
+        <a:cs typeface="+mn-cs"/>
+      </a:defRPr>
+    </a:lvl4pPr>
+    <a:lvl5pPr marL="1828800" algn="l" defTabSz="914400" rtl="0" eaLnBrk="1" latinLnBrk="0" hangingPunct="1">
+      <a:defRPr sz="1200" kern="1200">
+        <a:solidFill>
+          <a:schemeClr val="tx1"/>
+        </a:solidFill>
+        <a:latin typeface="+mn-lt"/>
+        <a:ea typeface="+mn-ea"/>
+        <a:cs typeface="+mn-cs"/>
+      </a:defRPr>
+    </a:lvl5pPr>
+    <a:lvl6pPr marL="2286000" algn="l" defTabSz="914400" rtl="0" eaLnBrk="1" latinLnBrk="0" hangingPunct="1">
+      <a:defRPr sz="1200" kern="1200">
+        <a:solidFill>
+          <a:schemeClr val="tx1"/>
+        </a:solidFill>
+        <a:latin typeface="+mn-lt"/>
+        <a:ea typeface="+mn-ea"/>
+        <a:cs typeface="+mn-cs"/>
+      </a:defRPr>
+    </a:lvl6pPr>
+    <a:lvl7pPr marL="2743200" algn="l" defTabSz="914400" rtl="0" eaLnBrk="1" latinLnBrk="0" hangingPunct="1">
+      <a:defRPr sz="1200" kern="1200">
+        <a:solidFill>
+          <a:schemeClr val="tx1"/>
+        </a:solidFill>
+        <a:latin typeface="+mn-lt"/>
+        <a:ea typeface="+mn-ea"/>
+        <a:cs typeface="+mn-cs"/>
+      </a:defRPr>
+    </a:lvl7pPr>
+    <a:lvl8pPr marL="3200400" algn="l" defTabSz="914400" rtl="0" eaLnBrk="1" latinLnBrk="0" hangingPunct="1">
+      <a:defRPr sz="1200" kern="1200">
+        <a:solidFill>
+          <a:schemeClr val="tx1"/>
+        </a:solidFill>
+        <a:latin typeface="+mn-lt"/>
+        <a:ea typeface="+mn-ea"/>
+        <a:cs typeface="+mn-cs"/>
+      </a:defRPr>
+    </a:lvl8pPr>
+    <a:lvl9pPr marL="3657600" algn="l" defTabSz="914400" rtl="0" eaLnBrk="1" latinLnBrk="0" hangingPunct="1">
+      <a:defRPr sz="1200" kern="1200">
+        <a:solidFill>
+          <a:schemeClr val="tx1"/>
+        </a:solidFill>
+        <a:latin typeface="+mn-lt"/>
+        <a:ea typeface="+mn-ea"/>
+        <a:cs typeface="+mn-cs"/>
+      </a:defRPr>
+    </a:lvl9pPr>
+  </p:notesStyle>
+</p:notesMaster>
+</file>
+
+<file path=ppt/notesSlides/notesSlide1.xml><?xml version="1.0" encoding="utf-8"?>
+<p:notes xmlns:a="http://schemas.openxmlformats.org/drawingml/2006/main" xmlns:r="http://schemas.openxmlformats.org/officeDocument/2006/relationships" xmlns:p="http://schemas.openxmlformats.org/presentationml/2006/main">
+  <p:cSld>
+    <p:spTree>
+      <p:nvGrpSpPr>
+        <p:cNvPr id="1" name=""/>
+        <p:cNvGrpSpPr/>
+        <p:nvPr/>
+      </p:nvGrpSpPr>
+      <p:grpSpPr>
+        <a:xfrm>
+          <a:off x="0" y="0"/>
+          <a:ext cx="0" cy="0"/>
+          <a:chOff x="0" y="0"/>
+          <a:chExt cx="0" cy="0"/>
+        </a:xfrm>
+      </p:grpSpPr>
+      <p:sp>
+        <p:nvSpPr>
+          <p:cNvPr id="2" name="Segnaposto immagine diapositiva 1"/>
+          <p:cNvSpPr>
+            <a:spLocks noGrp="1" noRot="1" noChangeAspect="1"/>
+          </p:cNvSpPr>
+          <p:nvPr>
+            <p:ph type="sldImg"/>
+          </p:nvPr>
+        </p:nvSpPr>
+        <p:spPr/>
+      </p:sp>
+      <p:sp>
+        <p:nvSpPr>
+          <p:cNvPr id="3" name="Segnaposto note 2"/>
+          <p:cNvSpPr>
+            <a:spLocks noGrp="1"/>
+          </p:cNvSpPr>
+          <p:nvPr>
+            <p:ph type="body" idx="1"/>
+          </p:nvPr>
+        </p:nvSpPr>
+        <p:spPr/>
+        <p:txBody>
+          <a:bodyPr/>
+          <a:lstStyle/>
+          <a:p>
+            <a:endParaRPr lang="it-IT" dirty="0"/>
+          </a:p>
+        </p:txBody>
+      </p:sp>
+      <p:sp>
+        <p:nvSpPr>
+          <p:cNvPr id="4" name="Segnaposto numero diapositiva 3"/>
+          <p:cNvSpPr>
+            <a:spLocks noGrp="1"/>
+          </p:cNvSpPr>
+          <p:nvPr>
+            <p:ph type="sldNum" sz="quarter" idx="5"/>
+          </p:nvPr>
+        </p:nvSpPr>
+        <p:spPr/>
+        <p:txBody>
+          <a:bodyPr/>
+          <a:lstStyle/>
+          <a:p>
+            <a:fld id="{DDE424C1-00E5-0640-A88A-910797F4686B}" type="slidenum">
+              <a:rPr lang="it-IT" smtClean="0"/>
+              <a:t>16</a:t>
+            </a:fld>
+            <a:endParaRPr lang="it-IT"/>
+          </a:p>
+        </p:txBody>
+      </p:sp>
+    </p:spTree>
+    <p:extLst>
+      <p:ext uri="{BB962C8B-B14F-4D97-AF65-F5344CB8AC3E}">
+        <p14:creationId xmlns:p14="http://schemas.microsoft.com/office/powerpoint/2010/main" val="1783661961"/>
+      </p:ext>
+    </p:extLst>
+  </p:cSld>
+  <p:clrMapOvr>
+    <a:masterClrMapping/>
+  </p:clrMapOvr>
+</p:notes>
+</file>
+
 <file path=ppt/slideLayouts/slideLayout1.xml><?xml version="1.0" encoding="utf-8"?>
 <p:sldLayout xmlns:a="http://schemas.openxmlformats.org/drawingml/2006/main" xmlns:r="http://schemas.openxmlformats.org/officeDocument/2006/relationships" xmlns:p="http://schemas.openxmlformats.org/presentationml/2006/main" showMasterSp="0" type="title" preserve="1">
   <p:cSld name="Title Slide">
@@ -5890,7 +6327,7 @@
           <a:p>
             <a:fld id="{9184DA70-C731-4C70-880D-CCD4705E623C}" type="datetime1">
               <a:rPr lang="en-US" smtClean="0"/>
-              <a:t>5/25/2020</a:t>
+              <a:t>5/27/2020</a:t>
             </a:fld>
             <a:endParaRPr lang="en-US" dirty="0"/>
           </a:p>
@@ -6078,7 +6515,7 @@
           <a:p>
             <a:fld id="{B612A279-0833-481D-8C56-F67FD0AC6C50}" type="datetime1">
               <a:rPr lang="en-US" smtClean="0"/>
-              <a:t>5/25/2020</a:t>
+              <a:t>5/27/2020</a:t>
             </a:fld>
             <a:endParaRPr lang="en-US" dirty="0"/>
           </a:p>
@@ -6320,7 +6757,7 @@
           <a:p>
             <a:fld id="{6587DA83-5663-4C9C-B9AA-0B40A3DAFF81}" type="datetime1">
               <a:rPr lang="en-US" smtClean="0"/>
-              <a:t>5/25/2020</a:t>
+              <a:t>5/27/2020</a:t>
             </a:fld>
             <a:endParaRPr lang="en-US" dirty="0"/>
           </a:p>
@@ -6508,7 +6945,7 @@
           <a:p>
             <a:fld id="{4BE1D723-8F53-4F53-90B0-1982A396982E}" type="datetime1">
               <a:rPr lang="en-US" smtClean="0"/>
-              <a:t>5/25/2020</a:t>
+              <a:t>5/27/2020</a:t>
             </a:fld>
             <a:endParaRPr lang="en-US" dirty="0"/>
           </a:p>
@@ -6881,7 +7318,7 @@
           <a:p>
             <a:fld id="{97669AF7-7BEB-44E4-9852-375E34362B5B}" type="datetime1">
               <a:rPr lang="en-US" smtClean="0"/>
-              <a:t>5/25/2020</a:t>
+              <a:t>5/27/2020</a:t>
             </a:fld>
             <a:endParaRPr lang="en-US" dirty="0"/>
           </a:p>
@@ -7136,7 +7573,7 @@
           <a:p>
             <a:fld id="{BAAAC38D-0552-4C82-B593-E6124DFADBE2}" type="datetime1">
               <a:rPr lang="en-US" smtClean="0"/>
-              <a:t>5/25/2020</a:t>
+              <a:t>5/27/2020</a:t>
             </a:fld>
             <a:endParaRPr lang="en-US" dirty="0"/>
           </a:p>
@@ -7533,7 +7970,7 @@
           <a:p>
             <a:fld id="{D9DF0F1C-5577-4ACB-BB62-DF8F3C494C7E}" type="datetime1">
               <a:rPr lang="en-US" smtClean="0"/>
-              <a:t>5/25/2020</a:t>
+              <a:t>5/27/2020</a:t>
             </a:fld>
             <a:endParaRPr lang="en-US" dirty="0"/>
           </a:p>
@@ -7669,7 +8106,7 @@
           <a:p>
             <a:fld id="{1775B394-D9F9-4F0C-B15D-605F45CB9E9F}" type="datetime1">
               <a:rPr lang="en-US" smtClean="0"/>
-              <a:t>5/25/2020</a:t>
+              <a:t>5/27/2020</a:t>
             </a:fld>
             <a:endParaRPr lang="en-US" dirty="0"/>
           </a:p>
@@ -7826,7 +8263,7 @@
           <a:p>
             <a:fld id="{39667345-2558-425A-8533-9BFDBCE15005}" type="datetime1">
               <a:rPr lang="en-US" smtClean="0"/>
-              <a:t>5/25/2020</a:t>
+              <a:t>5/27/2020</a:t>
             </a:fld>
             <a:endParaRPr lang="en-US" dirty="0"/>
           </a:p>
@@ -8155,7 +8592,7 @@
           <a:p>
             <a:fld id="{92BEA474-078D-4E9B-9B14-09A87B19DC46}" type="datetime1">
               <a:rPr lang="en-US" smtClean="0"/>
-              <a:t>5/25/2020</a:t>
+              <a:t>5/27/2020</a:t>
             </a:fld>
             <a:endParaRPr lang="en-US" dirty="0"/>
           </a:p>
@@ -8505,7 +8942,7 @@
           <a:p>
             <a:fld id="{4907D986-8816-4272-A432-0437A28A9828}" type="datetime1">
               <a:rPr lang="en-US" smtClean="0"/>
-              <a:t>5/25/2020</a:t>
+              <a:t>5/27/2020</a:t>
             </a:fld>
             <a:endParaRPr lang="en-US" dirty="0"/>
           </a:p>
@@ -8766,7 +9203,7 @@
           <a:p>
             <a:fld id="{62D6E202-B606-4609-B914-27C9371A1F6D}" type="datetime1">
               <a:rPr lang="en-US" smtClean="0"/>
-              <a:t>5/25/2020</a:t>
+              <a:t>5/27/2020</a:t>
             </a:fld>
             <a:endParaRPr lang="en-US" dirty="0"/>
           </a:p>
@@ -10527,17 +10964,6 @@
           <a:p>
             <a:pPr algn="r"/>
             <a:r>
-              <a:rPr lang="en-US" sz="8000" dirty="0" err="1">
-                <a:solidFill>
-                  <a:schemeClr val="tx1">
-                    <a:lumMod val="85000"/>
-                    <a:lumOff val="15000"/>
-                  </a:schemeClr>
-                </a:solidFill>
-              </a:rPr>
-              <a:t>Parte</a:t>
-            </a:r>
-            <a:r>
               <a:rPr lang="en-US" sz="8000" dirty="0">
                 <a:solidFill>
                   <a:schemeClr val="tx1">
@@ -10546,7 +10972,7 @@
                   </a:schemeClr>
                 </a:solidFill>
               </a:rPr>
-              <a:t> 3</a:t>
+              <a:t>Parte 3</a:t>
             </a:r>
           </a:p>
         </p:txBody>
@@ -11123,7 +11549,7 @@
         </p:nvSpPr>
         <p:spPr>
           <a:xfrm>
-            <a:off x="1097280" y="516835"/>
+            <a:off x="1069846" y="261934"/>
             <a:ext cx="5977937" cy="1666501"/>
           </a:xfrm>
         </p:spPr>
@@ -11230,23 +11656,7 @@
                   <a:schemeClr val="tx1"/>
                 </a:solidFill>
               </a:rPr>
-              <a:t>Tramite </a:t>
-            </a:r>
-            <a:r>
-              <a:rPr lang="it-IT" sz="1800" dirty="0" err="1">
-                <a:solidFill>
-                  <a:schemeClr val="tx1"/>
-                </a:solidFill>
-              </a:rPr>
-              <a:t>Postman</a:t>
-            </a:r>
-            <a:r>
-              <a:rPr lang="it-IT" sz="1800" dirty="0">
-                <a:solidFill>
-                  <a:schemeClr val="tx1"/>
-                </a:solidFill>
-              </a:rPr>
-              <a:t> abbiamo testato il corretto funzionamento della funzione.</a:t>
+              <a:t>Tramite Postman abbiamo testato il corretto funzionamento della funzione.</a:t>
             </a:r>
           </a:p>
           <a:p>
@@ -11422,7 +11832,7 @@
           <a:p>
             <a:pPr algn="r"/>
             <a:r>
-              <a:rPr lang="it-IT" dirty="0"/>
+              <a:rPr lang="it-IT" u="sng" dirty="0"/>
               <a:t>Risultato</a:t>
             </a:r>
           </a:p>
@@ -11665,7 +12075,7 @@
             <p:nvPr/>
           </p:nvSpPr>
           <p:spPr>
-            <a:xfrm rot="15964465">
+            <a:xfrm rot="16200000">
               <a:off x="9294432" y="5938394"/>
               <a:ext cx="224545" cy="179785"/>
             </a:xfrm>
@@ -11819,18 +12229,13 @@
             <a:lstStyle/>
             <a:p>
               <a:r>
-                <a:rPr lang="it-IT" sz="1200">
+                <a:rPr lang="it-IT" sz="1200" dirty="0">
                   <a:solidFill>
                     <a:schemeClr val="bg2"/>
                   </a:solidFill>
                 </a:rPr>
                 <a:t>Suggeriti</a:t>
               </a:r>
-              <a:endParaRPr lang="it-IT" sz="1200" dirty="0">
-                <a:solidFill>
-                  <a:schemeClr val="bg2"/>
-                </a:solidFill>
-              </a:endParaRPr>
             </a:p>
           </p:txBody>
         </p:sp>
@@ -11932,7 +12337,7 @@
           </p:blipFill>
           <p:spPr>
             <a:xfrm>
-              <a:off x="10281209" y="3598778"/>
+              <a:off x="10293347" y="3598777"/>
               <a:ext cx="1225145" cy="675753"/>
             </a:xfrm>
             <a:prstGeom prst="rect">
@@ -12205,21 +12610,7 @@
             </a:r>
             <a:r>
               <a:rPr lang="it-IT" dirty="0"/>
-              <a:t> vengono ottenuti titoli e anteprime dei video consigliati, che vengono esposti sotto al video in esecuzione. L’utente può </a:t>
-            </a:r>
-            <a:r>
-              <a:rPr lang="it-IT" dirty="0" err="1"/>
-              <a:t>cliccarli</a:t>
-            </a:r>
-            <a:r>
-              <a:rPr lang="it-IT" dirty="0"/>
-              <a:t> e passare alla visione del </a:t>
-            </a:r>
-          </a:p>
-          <a:p>
-            <a:r>
-              <a:rPr lang="it-IT" dirty="0"/>
-              <a:t>Video suggerito</a:t>
+              <a:t> vengono ottenuti titoli e anteprime dei video consigliati, che vengono esposti sotto al video in esecuzione. L’utente può selezionarli e passare alla visione del video suggerito.</a:t>
             </a:r>
           </a:p>
         </p:txBody>
@@ -12269,6 +12660,400 @@
     <p:extLst>
       <p:ext uri="{BB962C8B-B14F-4D97-AF65-F5344CB8AC3E}">
         <p14:creationId xmlns:p14="http://schemas.microsoft.com/office/powerpoint/2010/main" val="853132772"/>
+      </p:ext>
+    </p:extLst>
+  </p:cSld>
+  <p:clrMapOvr>
+    <a:masterClrMapping/>
+  </p:clrMapOvr>
+</p:sld>
+</file>
+
+<file path=ppt/slides/slide16.xml><?xml version="1.0" encoding="utf-8"?>
+<p:sld xmlns:a="http://schemas.openxmlformats.org/drawingml/2006/main" xmlns:r="http://schemas.openxmlformats.org/officeDocument/2006/relationships" xmlns:p="http://schemas.openxmlformats.org/presentationml/2006/main">
+  <p:cSld>
+    <p:spTree>
+      <p:nvGrpSpPr>
+        <p:cNvPr id="1" name=""/>
+        <p:cNvGrpSpPr/>
+        <p:nvPr/>
+      </p:nvGrpSpPr>
+      <p:grpSpPr>
+        <a:xfrm>
+          <a:off x="0" y="0"/>
+          <a:ext cx="0" cy="0"/>
+          <a:chOff x="0" y="0"/>
+          <a:chExt cx="0" cy="0"/>
+        </a:xfrm>
+      </p:grpSpPr>
+      <p:sp>
+        <p:nvSpPr>
+          <p:cNvPr id="2" name="Titolo 1">
+            <a:extLst>
+              <a:ext uri="{FF2B5EF4-FFF2-40B4-BE49-F238E27FC236}">
+                <a16:creationId xmlns:a16="http://schemas.microsoft.com/office/drawing/2014/main" id="{43BA03D9-9E12-154B-940F-91215B0C037D}"/>
+              </a:ext>
+            </a:extLst>
+          </p:cNvPr>
+          <p:cNvSpPr>
+            <a:spLocks noGrp="1"/>
+          </p:cNvSpPr>
+          <p:nvPr>
+            <p:ph type="title"/>
+          </p:nvPr>
+        </p:nvSpPr>
+        <p:spPr/>
+        <p:txBody>
+          <a:bodyPr/>
+          <a:lstStyle/>
+          <a:p>
+            <a:r>
+              <a:rPr lang="it-IT" dirty="0"/>
+              <a:t>CRITICITA’ TECNICHE</a:t>
+            </a:r>
+          </a:p>
+        </p:txBody>
+      </p:sp>
+      <p:sp>
+        <p:nvSpPr>
+          <p:cNvPr id="5" name="Rettangolo con angoli arrotondati 4">
+            <a:extLst>
+              <a:ext uri="{FF2B5EF4-FFF2-40B4-BE49-F238E27FC236}">
+                <a16:creationId xmlns:a16="http://schemas.microsoft.com/office/drawing/2014/main" id="{3B5C43CC-DC92-3B4E-9BF0-DA9884BADF4A}"/>
+              </a:ext>
+            </a:extLst>
+          </p:cNvPr>
+          <p:cNvSpPr/>
+          <p:nvPr/>
+        </p:nvSpPr>
+        <p:spPr>
+          <a:xfrm>
+            <a:off x="1198605" y="2247724"/>
+            <a:ext cx="9957075" cy="1299320"/>
+          </a:xfrm>
+          <a:prstGeom prst="roundRect">
+            <a:avLst>
+              <a:gd name="adj" fmla="val 10000"/>
+            </a:avLst>
+          </a:prstGeom>
+        </p:spPr>
+        <p:style>
+          <a:lnRef idx="0">
+            <a:schemeClr val="lt1">
+              <a:alpha val="0"/>
+              <a:hueOff val="0"/>
+              <a:satOff val="0"/>
+              <a:lumOff val="0"/>
+              <a:alphaOff val="0"/>
+            </a:schemeClr>
+          </a:lnRef>
+          <a:fillRef idx="1">
+            <a:schemeClr val="accent3">
+              <a:hueOff val="0"/>
+              <a:satOff val="0"/>
+              <a:lumOff val="0"/>
+              <a:alphaOff val="0"/>
+            </a:schemeClr>
+          </a:fillRef>
+          <a:effectRef idx="0">
+            <a:schemeClr val="accent3">
+              <a:hueOff val="0"/>
+              <a:satOff val="0"/>
+              <a:lumOff val="0"/>
+              <a:alphaOff val="0"/>
+            </a:schemeClr>
+          </a:effectRef>
+          <a:fontRef idx="minor"/>
+        </p:style>
+        <p:txBody>
+          <a:bodyPr/>
+          <a:lstStyle/>
+          <a:p>
+            <a:r>
+              <a:rPr lang="it-IT" dirty="0"/>
+              <a:t>	</a:t>
+            </a:r>
+            <a:r>
+              <a:rPr lang="it-IT" dirty="0">
+                <a:solidFill>
+                  <a:schemeClr val="bg1"/>
+                </a:solidFill>
+              </a:rPr>
+              <a:t>UTILIZZO DI UN TOOL ESTERNO</a:t>
+            </a:r>
+            <a:r>
+              <a:rPr lang="it-IT" dirty="0"/>
+              <a:t>:  per il test del corretto funzionamento della 	funzione creata abbiamo dovuto utilizzare il tool Postman che offre la possibilità di 	eseguire la chiamata GET e passare la query JSON dopo l’inserimento del link di 	collegamento alla nostra API creata attraverso i servizi AWS. </a:t>
+            </a:r>
+          </a:p>
+        </p:txBody>
+      </p:sp>
+      <p:sp>
+        <p:nvSpPr>
+          <p:cNvPr id="11" name="Rettangolo 10">
+            <a:extLst>
+              <a:ext uri="{FF2B5EF4-FFF2-40B4-BE49-F238E27FC236}">
+                <a16:creationId xmlns:a16="http://schemas.microsoft.com/office/drawing/2014/main" id="{271E89B1-2190-924C-896A-002BD1F099A4}"/>
+              </a:ext>
+            </a:extLst>
+          </p:cNvPr>
+          <p:cNvSpPr/>
+          <p:nvPr/>
+        </p:nvSpPr>
+        <p:spPr>
+          <a:xfrm>
+            <a:off x="8717472" y="5035378"/>
+            <a:ext cx="2377248" cy="1074224"/>
+          </a:xfrm>
+          <a:prstGeom prst="rect">
+            <a:avLst/>
+          </a:prstGeom>
+        </p:spPr>
+        <p:style>
+          <a:lnRef idx="0">
+            <a:schemeClr val="dk1">
+              <a:alpha val="0"/>
+              <a:hueOff val="0"/>
+              <a:satOff val="0"/>
+              <a:lumOff val="0"/>
+              <a:alphaOff val="0"/>
+            </a:schemeClr>
+          </a:lnRef>
+          <a:fillRef idx="0">
+            <a:schemeClr val="lt1">
+              <a:alpha val="0"/>
+              <a:hueOff val="0"/>
+              <a:satOff val="0"/>
+              <a:lumOff val="0"/>
+              <a:alphaOff val="0"/>
+            </a:schemeClr>
+          </a:fillRef>
+          <a:effectRef idx="0">
+            <a:schemeClr val="lt1">
+              <a:alpha val="0"/>
+              <a:hueOff val="0"/>
+              <a:satOff val="0"/>
+              <a:lumOff val="0"/>
+              <a:alphaOff val="0"/>
+            </a:schemeClr>
+          </a:effectRef>
+          <a:fontRef idx="minor">
+            <a:schemeClr val="bg1">
+              <a:hueOff val="0"/>
+              <a:satOff val="0"/>
+              <a:lumOff val="0"/>
+              <a:alphaOff val="0"/>
+            </a:schemeClr>
+          </a:fontRef>
+        </p:style>
+      </p:sp>
+      <p:sp>
+        <p:nvSpPr>
+          <p:cNvPr id="14" name="Rettangolo 13" descr="Web Design">
+            <a:extLst>
+              <a:ext uri="{FF2B5EF4-FFF2-40B4-BE49-F238E27FC236}">
+                <a16:creationId xmlns:a16="http://schemas.microsoft.com/office/drawing/2014/main" id="{DCA5EA90-F6C1-A842-A611-67054AC661D6}"/>
+              </a:ext>
+            </a:extLst>
+          </p:cNvPr>
+          <p:cNvSpPr/>
+          <p:nvPr/>
+        </p:nvSpPr>
+        <p:spPr>
+          <a:xfrm>
+            <a:off x="1354961" y="2601972"/>
+            <a:ext cx="590823" cy="590823"/>
+          </a:xfrm>
+          <a:prstGeom prst="rect">
+            <a:avLst/>
+          </a:prstGeom>
+          <a:blipFill>
+            <a:blip r:embed="rId3">
+              <a:extLst>
+                <a:ext uri="{28A0092B-C50C-407E-A947-70E740481C1C}">
+                  <a14:useLocalDpi xmlns:a14="http://schemas.microsoft.com/office/drawing/2010/main" val="0"/>
+                </a:ext>
+                <a:ext uri="{96DAC541-7B7A-43D3-8B79-37D633B846F1}">
+                  <asvg:svgBlip xmlns:asvg="http://schemas.microsoft.com/office/drawing/2016/SVG/main" r:embed="rId4"/>
+                </a:ext>
+              </a:extLst>
+            </a:blip>
+            <a:stretch>
+              <a:fillRect/>
+            </a:stretch>
+          </a:blipFill>
+          <a:ln>
+            <a:noFill/>
+          </a:ln>
+        </p:spPr>
+        <p:style>
+          <a:lnRef idx="2">
+            <a:scrgbClr r="0" g="0" b="0"/>
+          </a:lnRef>
+          <a:fillRef idx="1">
+            <a:scrgbClr r="0" g="0" b="0"/>
+          </a:fillRef>
+          <a:effectRef idx="0">
+            <a:schemeClr val="bg1">
+              <a:hueOff val="0"/>
+              <a:satOff val="0"/>
+              <a:lumOff val="0"/>
+              <a:alphaOff val="0"/>
+            </a:schemeClr>
+          </a:effectRef>
+          <a:fontRef idx="minor">
+            <a:schemeClr val="dk1">
+              <a:hueOff val="0"/>
+              <a:satOff val="0"/>
+              <a:lumOff val="0"/>
+              <a:alphaOff val="0"/>
+            </a:schemeClr>
+          </a:fontRef>
+        </p:style>
+      </p:sp>
+      <p:sp>
+        <p:nvSpPr>
+          <p:cNvPr id="12" name="Rettangolo con angoli arrotondati 11">
+            <a:extLst>
+              <a:ext uri="{FF2B5EF4-FFF2-40B4-BE49-F238E27FC236}">
+                <a16:creationId xmlns:a16="http://schemas.microsoft.com/office/drawing/2014/main" id="{33DD6183-6267-AE4A-A1FE-8C013FEB2981}"/>
+              </a:ext>
+            </a:extLst>
+          </p:cNvPr>
+          <p:cNvSpPr/>
+          <p:nvPr/>
+        </p:nvSpPr>
+        <p:spPr>
+          <a:xfrm>
+            <a:off x="1190621" y="3677437"/>
+            <a:ext cx="9957075" cy="1003692"/>
+          </a:xfrm>
+          <a:prstGeom prst="roundRect">
+            <a:avLst>
+              <a:gd name="adj" fmla="val 10000"/>
+            </a:avLst>
+          </a:prstGeom>
+        </p:spPr>
+        <p:style>
+          <a:lnRef idx="0">
+            <a:schemeClr val="lt1">
+              <a:alpha val="0"/>
+              <a:hueOff val="0"/>
+              <a:satOff val="0"/>
+              <a:lumOff val="0"/>
+              <a:alphaOff val="0"/>
+            </a:schemeClr>
+          </a:lnRef>
+          <a:fillRef idx="1">
+            <a:schemeClr val="accent4">
+              <a:hueOff val="0"/>
+              <a:satOff val="0"/>
+              <a:lumOff val="0"/>
+              <a:alphaOff val="0"/>
+            </a:schemeClr>
+          </a:fillRef>
+          <a:effectRef idx="0">
+            <a:schemeClr val="accent4">
+              <a:hueOff val="0"/>
+              <a:satOff val="0"/>
+              <a:lumOff val="0"/>
+              <a:alphaOff val="0"/>
+            </a:schemeClr>
+          </a:effectRef>
+          <a:fontRef idx="minor"/>
+        </p:style>
+        <p:txBody>
+          <a:bodyPr/>
+          <a:lstStyle/>
+          <a:p>
+            <a:r>
+              <a:rPr lang="en-US" dirty="0"/>
+              <a:t>	</a:t>
+            </a:r>
+            <a:r>
+              <a:rPr lang="en-US" dirty="0">
+                <a:solidFill>
+                  <a:schemeClr val="bg1"/>
+                </a:solidFill>
+              </a:rPr>
+              <a:t>CODICE: </a:t>
+            </a:r>
+            <a:r>
+              <a:rPr lang="it-IT" dirty="0"/>
+              <a:t>comprensione del codice, della sintassi e sviluppo della funzione. 	Comprensione del funzionamento delle Lamba function e della loro corretta 	implementazione.</a:t>
+            </a:r>
+            <a:endParaRPr lang="en-US" dirty="0"/>
+          </a:p>
+        </p:txBody>
+      </p:sp>
+      <p:sp>
+        <p:nvSpPr>
+          <p:cNvPr id="17" name="Rettangolo 16" descr="Gears">
+            <a:extLst>
+              <a:ext uri="{FF2B5EF4-FFF2-40B4-BE49-F238E27FC236}">
+                <a16:creationId xmlns:a16="http://schemas.microsoft.com/office/drawing/2014/main" id="{56539F9C-48C0-3345-9522-D80668F3D30A}"/>
+              </a:ext>
+            </a:extLst>
+          </p:cNvPr>
+          <p:cNvSpPr/>
+          <p:nvPr/>
+        </p:nvSpPr>
+        <p:spPr>
+          <a:xfrm>
+            <a:off x="1354960" y="3883871"/>
+            <a:ext cx="590823" cy="590823"/>
+          </a:xfrm>
+          <a:prstGeom prst="rect">
+            <a:avLst/>
+          </a:prstGeom>
+          <a:blipFill>
+            <a:blip r:embed="rId5">
+              <a:extLst>
+                <a:ext uri="{28A0092B-C50C-407E-A947-70E740481C1C}">
+                  <a14:useLocalDpi xmlns:a14="http://schemas.microsoft.com/office/drawing/2010/main" val="0"/>
+                </a:ext>
+                <a:ext uri="{96DAC541-7B7A-43D3-8B79-37D633B846F1}">
+                  <asvg:svgBlip xmlns:asvg="http://schemas.microsoft.com/office/drawing/2016/SVG/main" r:embed="rId6"/>
+                </a:ext>
+              </a:extLst>
+            </a:blip>
+            <a:stretch>
+              <a:fillRect/>
+            </a:stretch>
+          </a:blipFill>
+          <a:ln>
+            <a:noFill/>
+          </a:ln>
+        </p:spPr>
+        <p:style>
+          <a:lnRef idx="2">
+            <a:scrgbClr r="0" g="0" b="0"/>
+          </a:lnRef>
+          <a:fillRef idx="1">
+            <a:scrgbClr r="0" g="0" b="0"/>
+          </a:fillRef>
+          <a:effectRef idx="0">
+            <a:schemeClr val="bg1">
+              <a:hueOff val="0"/>
+              <a:satOff val="0"/>
+              <a:lumOff val="0"/>
+              <a:alphaOff val="0"/>
+            </a:schemeClr>
+          </a:effectRef>
+          <a:fontRef idx="minor">
+            <a:schemeClr val="dk1">
+              <a:hueOff val="0"/>
+              <a:satOff val="0"/>
+              <a:lumOff val="0"/>
+              <a:alphaOff val="0"/>
+            </a:schemeClr>
+          </a:fontRef>
+        </p:style>
+      </p:sp>
+    </p:spTree>
+    <p:extLst>
+      <p:ext uri="{BB962C8B-B14F-4D97-AF65-F5344CB8AC3E}">
+        <p14:creationId xmlns:p14="http://schemas.microsoft.com/office/powerpoint/2010/main" val="3172067132"/>
       </p:ext>
     </p:extLst>
   </p:cSld>
@@ -14563,7 +15348,7 @@
           <a:p>
             <a:pPr algn="r"/>
             <a:r>
-              <a:rPr lang="en-US" sz="8000">
+              <a:rPr lang="en-US" sz="8000" dirty="0">
                 <a:solidFill>
                   <a:schemeClr val="tx1">
                     <a:lumMod val="85000"/>
@@ -16532,4 +17317,299 @@
     </a:ext>
   </a:extLst>
 </a:theme>
+</file>
+
+<file path=ppt/theme/theme2.xml><?xml version="1.0" encoding="utf-8"?>
+<a:theme xmlns:a="http://schemas.openxmlformats.org/drawingml/2006/main" name="Tema di Office">
+  <a:themeElements>
+    <a:clrScheme name="Office">
+      <a:dk1>
+        <a:sysClr val="windowText" lastClr="000000"/>
+      </a:dk1>
+      <a:lt1>
+        <a:sysClr val="window" lastClr="FFFFFF"/>
+      </a:lt1>
+      <a:dk2>
+        <a:srgbClr val="44546A"/>
+      </a:dk2>
+      <a:lt2>
+        <a:srgbClr val="E7E6E6"/>
+      </a:lt2>
+      <a:accent1>
+        <a:srgbClr val="4472C4"/>
+      </a:accent1>
+      <a:accent2>
+        <a:srgbClr val="ED7D31"/>
+      </a:accent2>
+      <a:accent3>
+        <a:srgbClr val="A5A5A5"/>
+      </a:accent3>
+      <a:accent4>
+        <a:srgbClr val="FFC000"/>
+      </a:accent4>
+      <a:accent5>
+        <a:srgbClr val="5B9BD5"/>
+      </a:accent5>
+      <a:accent6>
+        <a:srgbClr val="70AD47"/>
+      </a:accent6>
+      <a:hlink>
+        <a:srgbClr val="0563C1"/>
+      </a:hlink>
+      <a:folHlink>
+        <a:srgbClr val="954F72"/>
+      </a:folHlink>
+    </a:clrScheme>
+    <a:fontScheme name="Office">
+      <a:majorFont>
+        <a:latin typeface="Calibri Light" panose="020F0302020204030204"/>
+        <a:ea typeface=""/>
+        <a:cs typeface=""/>
+        <a:font script="Jpan" typeface="游ゴシック Light"/>
+        <a:font script="Hang" typeface="맑은 고딕"/>
+        <a:font script="Hans" typeface="等线 Light"/>
+        <a:font script="Hant" typeface="新細明體"/>
+        <a:font script="Arab" typeface="Times New Roman"/>
+        <a:font script="Hebr" typeface="Times New Roman"/>
+        <a:font script="Thai" typeface="Angsana New"/>
+        <a:font script="Ethi" typeface="Nyala"/>
+        <a:font script="Beng" typeface="Vrinda"/>
+        <a:font script="Gujr" typeface="Shruti"/>
+        <a:font script="Khmr" typeface="MoolBoran"/>
+        <a:font script="Knda" typeface="Tunga"/>
+        <a:font script="Guru" typeface="Raavi"/>
+        <a:font script="Cans" typeface="Euphemia"/>
+        <a:font script="Cher" typeface="Plantagenet Cherokee"/>
+        <a:font script="Yiii" typeface="Microsoft Yi Baiti"/>
+        <a:font script="Tibt" typeface="Microsoft Himalaya"/>
+        <a:font script="Thaa" typeface="MV Boli"/>
+        <a:font script="Deva" typeface="Mangal"/>
+        <a:font script="Telu" typeface="Gautami"/>
+        <a:font script="Taml" typeface="Latha"/>
+        <a:font script="Syrc" typeface="Estrangelo Edessa"/>
+        <a:font script="Orya" typeface="Kalinga"/>
+        <a:font script="Mlym" typeface="Kartika"/>
+        <a:font script="Laoo" typeface="DokChampa"/>
+        <a:font script="Sinh" typeface="Iskoola Pota"/>
+        <a:font script="Mong" typeface="Mongolian Baiti"/>
+        <a:font script="Viet" typeface="Times New Roman"/>
+        <a:font script="Uigh" typeface="Microsoft Uighur"/>
+        <a:font script="Geor" typeface="Sylfaen"/>
+        <a:font script="Armn" typeface="Arial"/>
+        <a:font script="Bugi" typeface="Leelawadee UI"/>
+        <a:font script="Bopo" typeface="Microsoft JhengHei"/>
+        <a:font script="Java" typeface="Javanese Text"/>
+        <a:font script="Lisu" typeface="Segoe UI"/>
+        <a:font script="Mymr" typeface="Myanmar Text"/>
+        <a:font script="Nkoo" typeface="Ebrima"/>
+        <a:font script="Olck" typeface="Nirmala UI"/>
+        <a:font script="Osma" typeface="Ebrima"/>
+        <a:font script="Phag" typeface="Phagspa"/>
+        <a:font script="Syrn" typeface="Estrangelo Edessa"/>
+        <a:font script="Syrj" typeface="Estrangelo Edessa"/>
+        <a:font script="Syre" typeface="Estrangelo Edessa"/>
+        <a:font script="Sora" typeface="Nirmala UI"/>
+        <a:font script="Tale" typeface="Microsoft Tai Le"/>
+        <a:font script="Talu" typeface="Microsoft New Tai Lue"/>
+        <a:font script="Tfng" typeface="Ebrima"/>
+      </a:majorFont>
+      <a:minorFont>
+        <a:latin typeface="Calibri" panose="020F0502020204030204"/>
+        <a:ea typeface=""/>
+        <a:cs typeface=""/>
+        <a:font script="Jpan" typeface="游ゴシック"/>
+        <a:font script="Hang" typeface="맑은 고딕"/>
+        <a:font script="Hans" typeface="等线"/>
+        <a:font script="Hant" typeface="新細明體"/>
+        <a:font script="Arab" typeface="Arial"/>
+        <a:font script="Hebr" typeface="Arial"/>
+        <a:font script="Thai" typeface="Cordia New"/>
+        <a:font script="Ethi" typeface="Nyala"/>
+        <a:font script="Beng" typeface="Vrinda"/>
+        <a:font script="Gujr" typeface="Shruti"/>
+        <a:font script="Khmr" typeface="DaunPenh"/>
+        <a:font script="Knda" typeface="Tunga"/>
+        <a:font script="Guru" typeface="Raavi"/>
+        <a:font script="Cans" typeface="Euphemia"/>
+        <a:font script="Cher" typeface="Plantagenet Cherokee"/>
+        <a:font script="Yiii" typeface="Microsoft Yi Baiti"/>
+        <a:font script="Tibt" typeface="Microsoft Himalaya"/>
+        <a:font script="Thaa" typeface="MV Boli"/>
+        <a:font script="Deva" typeface="Mangal"/>
+        <a:font script="Telu" typeface="Gautami"/>
+        <a:font script="Taml" typeface="Latha"/>
+        <a:font script="Syrc" typeface="Estrangelo Edessa"/>
+        <a:font script="Orya" typeface="Kalinga"/>
+        <a:font script="Mlym" typeface="Kartika"/>
+        <a:font script="Laoo" typeface="DokChampa"/>
+        <a:font script="Sinh" typeface="Iskoola Pota"/>
+        <a:font script="Mong" typeface="Mongolian Baiti"/>
+        <a:font script="Viet" typeface="Arial"/>
+        <a:font script="Uigh" typeface="Microsoft Uighur"/>
+        <a:font script="Geor" typeface="Sylfaen"/>
+        <a:font script="Armn" typeface="Arial"/>
+        <a:font script="Bugi" typeface="Leelawadee UI"/>
+        <a:font script="Bopo" typeface="Microsoft JhengHei"/>
+        <a:font script="Java" typeface="Javanese Text"/>
+        <a:font script="Lisu" typeface="Segoe UI"/>
+        <a:font script="Mymr" typeface="Myanmar Text"/>
+        <a:font script="Nkoo" typeface="Ebrima"/>
+        <a:font script="Olck" typeface="Nirmala UI"/>
+        <a:font script="Osma" typeface="Ebrima"/>
+        <a:font script="Phag" typeface="Phagspa"/>
+        <a:font script="Syrn" typeface="Estrangelo Edessa"/>
+        <a:font script="Syrj" typeface="Estrangelo Edessa"/>
+        <a:font script="Syre" typeface="Estrangelo Edessa"/>
+        <a:font script="Sora" typeface="Nirmala UI"/>
+        <a:font script="Tale" typeface="Microsoft Tai Le"/>
+        <a:font script="Talu" typeface="Microsoft New Tai Lue"/>
+        <a:font script="Tfng" typeface="Ebrima"/>
+      </a:minorFont>
+    </a:fontScheme>
+    <a:fmtScheme name="Office">
+      <a:fillStyleLst>
+        <a:solidFill>
+          <a:schemeClr val="phClr"/>
+        </a:solidFill>
+        <a:gradFill rotWithShape="1">
+          <a:gsLst>
+            <a:gs pos="0">
+              <a:schemeClr val="phClr">
+                <a:lumMod val="110000"/>
+                <a:satMod val="105000"/>
+                <a:tint val="67000"/>
+              </a:schemeClr>
+            </a:gs>
+            <a:gs pos="50000">
+              <a:schemeClr val="phClr">
+                <a:lumMod val="105000"/>
+                <a:satMod val="103000"/>
+                <a:tint val="73000"/>
+              </a:schemeClr>
+            </a:gs>
+            <a:gs pos="100000">
+              <a:schemeClr val="phClr">
+                <a:lumMod val="105000"/>
+                <a:satMod val="109000"/>
+                <a:tint val="81000"/>
+              </a:schemeClr>
+            </a:gs>
+          </a:gsLst>
+          <a:lin ang="5400000" scaled="0"/>
+        </a:gradFill>
+        <a:gradFill rotWithShape="1">
+          <a:gsLst>
+            <a:gs pos="0">
+              <a:schemeClr val="phClr">
+                <a:satMod val="103000"/>
+                <a:lumMod val="102000"/>
+                <a:tint val="94000"/>
+              </a:schemeClr>
+            </a:gs>
+            <a:gs pos="50000">
+              <a:schemeClr val="phClr">
+                <a:satMod val="110000"/>
+                <a:lumMod val="100000"/>
+                <a:shade val="100000"/>
+              </a:schemeClr>
+            </a:gs>
+            <a:gs pos="100000">
+              <a:schemeClr val="phClr">
+                <a:lumMod val="99000"/>
+                <a:satMod val="120000"/>
+                <a:shade val="78000"/>
+              </a:schemeClr>
+            </a:gs>
+          </a:gsLst>
+          <a:lin ang="5400000" scaled="0"/>
+        </a:gradFill>
+      </a:fillStyleLst>
+      <a:lnStyleLst>
+        <a:ln w="6350" cap="flat" cmpd="sng" algn="ctr">
+          <a:solidFill>
+            <a:schemeClr val="phClr"/>
+          </a:solidFill>
+          <a:prstDash val="solid"/>
+          <a:miter lim="800000"/>
+        </a:ln>
+        <a:ln w="12700" cap="flat" cmpd="sng" algn="ctr">
+          <a:solidFill>
+            <a:schemeClr val="phClr"/>
+          </a:solidFill>
+          <a:prstDash val="solid"/>
+          <a:miter lim="800000"/>
+        </a:ln>
+        <a:ln w="19050" cap="flat" cmpd="sng" algn="ctr">
+          <a:solidFill>
+            <a:schemeClr val="phClr"/>
+          </a:solidFill>
+          <a:prstDash val="solid"/>
+          <a:miter lim="800000"/>
+        </a:ln>
+      </a:lnStyleLst>
+      <a:effectStyleLst>
+        <a:effectStyle>
+          <a:effectLst/>
+        </a:effectStyle>
+        <a:effectStyle>
+          <a:effectLst/>
+        </a:effectStyle>
+        <a:effectStyle>
+          <a:effectLst>
+            <a:outerShdw blurRad="57150" dist="19050" dir="5400000" algn="ctr" rotWithShape="0">
+              <a:srgbClr val="000000">
+                <a:alpha val="63000"/>
+              </a:srgbClr>
+            </a:outerShdw>
+          </a:effectLst>
+        </a:effectStyle>
+      </a:effectStyleLst>
+      <a:bgFillStyleLst>
+        <a:solidFill>
+          <a:schemeClr val="phClr"/>
+        </a:solidFill>
+        <a:solidFill>
+          <a:schemeClr val="phClr">
+            <a:tint val="95000"/>
+            <a:satMod val="170000"/>
+          </a:schemeClr>
+        </a:solidFill>
+        <a:gradFill rotWithShape="1">
+          <a:gsLst>
+            <a:gs pos="0">
+              <a:schemeClr val="phClr">
+                <a:tint val="93000"/>
+                <a:satMod val="150000"/>
+                <a:shade val="98000"/>
+                <a:lumMod val="102000"/>
+              </a:schemeClr>
+            </a:gs>
+            <a:gs pos="50000">
+              <a:schemeClr val="phClr">
+                <a:tint val="98000"/>
+                <a:satMod val="130000"/>
+                <a:shade val="90000"/>
+                <a:lumMod val="103000"/>
+              </a:schemeClr>
+            </a:gs>
+            <a:gs pos="100000">
+              <a:schemeClr val="phClr">
+                <a:shade val="63000"/>
+                <a:satMod val="120000"/>
+              </a:schemeClr>
+            </a:gs>
+          </a:gsLst>
+          <a:lin ang="5400000" scaled="0"/>
+        </a:gradFill>
+      </a:bgFillStyleLst>
+    </a:fmtScheme>
+  </a:themeElements>
+  <a:objectDefaults/>
+  <a:extraClrSchemeLst/>
+  <a:extLst>
+    <a:ext uri="{05A4C25C-085E-4340-85A3-A5531E510DB2}">
+      <thm15:themeFamily xmlns:thm15="http://schemas.microsoft.com/office/thememl/2012/main" name="Office Theme" id="{62F939B6-93AF-4DB8-9C6B-D6C7DFDC589F}" vid="{4A3C46E8-61CC-4603-A589-7422A47A8E4A}"/>
+    </a:ext>
+  </a:extLst>
+</a:theme>
 </file>
</xml_diff>